<commit_message>
Analysis of 2017 Q2 Lending Club dataset
</commit_message>
<xml_diff>
--- a/slides/Sydeaka_Watson_EARL_2018_Workflow_Automation.pptx
+++ b/slides/Sydeaka_Watson_EARL_2018_Workflow_Automation.pptx
@@ -647,6 +647,90 @@
 </file>
 
 <file path=ppt/notesSlides/notesSlide3.xml><?xml version="1.0" encoding="utf-8"?>
+<p:notes xmlns:a="http://schemas.openxmlformats.org/drawingml/2006/main" xmlns:r="http://schemas.openxmlformats.org/officeDocument/2006/relationships" xmlns:p="http://schemas.openxmlformats.org/presentationml/2006/main">
+  <p:cSld>
+    <p:spTree>
+      <p:nvGrpSpPr>
+        <p:cNvPr id="1" name=""/>
+        <p:cNvGrpSpPr/>
+        <p:nvPr/>
+      </p:nvGrpSpPr>
+      <p:grpSpPr>
+        <a:xfrm>
+          <a:off x="0" y="0"/>
+          <a:ext cx="0" cy="0"/>
+          <a:chOff x="0" y="0"/>
+          <a:chExt cx="0" cy="0"/>
+        </a:xfrm>
+      </p:grpSpPr>
+      <p:sp>
+        <p:nvSpPr>
+          <p:cNvPr id="2" name="Slide Image Placeholder 1"/>
+          <p:cNvSpPr>
+            <a:spLocks noGrp="1" noRot="1" noChangeAspect="1"/>
+          </p:cNvSpPr>
+          <p:nvPr>
+            <p:ph type="sldImg"/>
+          </p:nvPr>
+        </p:nvSpPr>
+        <p:spPr/>
+      </p:sp>
+      <p:sp>
+        <p:nvSpPr>
+          <p:cNvPr id="3" name="Notes Placeholder 2"/>
+          <p:cNvSpPr>
+            <a:spLocks noGrp="1"/>
+          </p:cNvSpPr>
+          <p:nvPr>
+            <p:ph type="body" idx="1"/>
+          </p:nvPr>
+        </p:nvSpPr>
+        <p:spPr/>
+        <p:txBody>
+          <a:bodyPr/>
+          <a:lstStyle/>
+          <a:p>
+            <a:endParaRPr lang="en-US" dirty="0"/>
+          </a:p>
+        </p:txBody>
+      </p:sp>
+      <p:sp>
+        <p:nvSpPr>
+          <p:cNvPr id="4" name="Slide Number Placeholder 3"/>
+          <p:cNvSpPr>
+            <a:spLocks noGrp="1"/>
+          </p:cNvSpPr>
+          <p:nvPr>
+            <p:ph type="sldNum" sz="quarter" idx="5"/>
+          </p:nvPr>
+        </p:nvSpPr>
+        <p:spPr/>
+        <p:txBody>
+          <a:bodyPr/>
+          <a:lstStyle/>
+          <a:p>
+            <a:fld id="{1E0B824E-9E86-EB4D-B560-8CBEB7D5E0F5}" type="slidenum">
+              <a:rPr lang="en-US" smtClean="0"/>
+              <a:t>4</a:t>
+            </a:fld>
+            <a:endParaRPr lang="en-US"/>
+          </a:p>
+        </p:txBody>
+      </p:sp>
+    </p:spTree>
+    <p:extLst>
+      <p:ext uri="{BB962C8B-B14F-4D97-AF65-F5344CB8AC3E}">
+        <p14:creationId xmlns:p14="http://schemas.microsoft.com/office/powerpoint/2010/main" val="2471661604"/>
+      </p:ext>
+    </p:extLst>
+  </p:cSld>
+  <p:clrMapOvr>
+    <a:masterClrMapping/>
+  </p:clrMapOvr>
+</p:notes>
+</file>
+
+<file path=ppt/notesSlides/notesSlide4.xml><?xml version="1.0" encoding="utf-8"?>
 <p:notes xmlns:a="http://schemas.openxmlformats.org/drawingml/2006/main" xmlns:r="http://schemas.openxmlformats.org/officeDocument/2006/relationships" xmlns:p="http://schemas.openxmlformats.org/presentationml/2006/main">
   <p:cSld>
     <p:spTree>
@@ -3984,6 +4068,17 @@
           <a:p>
             <a:pPr algn="l"/>
             <a:r>
+              <a:rPr lang="en-US" sz="3100" b="1" i="1" dirty="0">
+                <a:solidFill>
+                  <a:srgbClr val="000000"/>
+                </a:solidFill>
+                <a:latin typeface="+mj-lt"/>
+                <a:ea typeface="+mj-ea"/>
+                <a:cs typeface="+mj-cs"/>
+              </a:rPr>
+              <a:t>R</a:t>
+            </a:r>
+            <a:r>
               <a:rPr lang="en-US" sz="3100" dirty="0">
                 <a:solidFill>
                   <a:srgbClr val="000000"/>
@@ -3992,7 +4087,7 @@
                 <a:ea typeface="+mj-ea"/>
                 <a:cs typeface="+mj-cs"/>
               </a:rPr>
-              <a:t>R-bots for Data Science Workflow Automation</a:t>
+              <a:t>-bots for Data Science Workflow Automation</a:t>
             </a:r>
             <a:endParaRPr lang="en-US" sz="3100" kern="1200" dirty="0">
               <a:solidFill>
@@ -5748,6 +5843,55 @@
           </a:p>
         </p:txBody>
       </p:sp>
+      <p:sp>
+        <p:nvSpPr>
+          <p:cNvPr id="4" name="TextBox 3">
+            <a:extLst>
+              <a:ext uri="{FF2B5EF4-FFF2-40B4-BE49-F238E27FC236}">
+                <a16:creationId xmlns:a16="http://schemas.microsoft.com/office/drawing/2014/main" id="{474043A3-16FD-EF4A-88E6-337FABF12C2F}"/>
+              </a:ext>
+            </a:extLst>
+          </p:cNvPr>
+          <p:cNvSpPr txBox="1"/>
+          <p:nvPr/>
+        </p:nvSpPr>
+        <p:spPr>
+          <a:xfrm>
+            <a:off x="2948539" y="3105833"/>
+            <a:ext cx="6294922" cy="646331"/>
+          </a:xfrm>
+          <a:prstGeom prst="rect">
+            <a:avLst/>
+          </a:prstGeom>
+          <a:noFill/>
+        </p:spPr>
+        <p:txBody>
+          <a:bodyPr wrap="square" rtlCol="0">
+            <a:spAutoFit/>
+          </a:bodyPr>
+          <a:lstStyle/>
+          <a:p>
+            <a:pPr marL="285750" indent="-285750">
+              <a:buFont typeface="Wingdings" pitchFamily="2" charset="2"/>
+              <a:buChar char="q"/>
+            </a:pPr>
+            <a:r>
+              <a:rPr lang="en-US" dirty="0"/>
+              <a:t>Workflow begins with data creation/ingestion.</a:t>
+            </a:r>
+          </a:p>
+          <a:p>
+            <a:pPr marL="285750" indent="-285750">
+              <a:buFont typeface="Wingdings" pitchFamily="2" charset="2"/>
+              <a:buChar char="q"/>
+            </a:pPr>
+            <a:r>
+              <a:rPr lang="en-US" dirty="0"/>
+              <a:t>Workflow “ends” with the distribution/publishing of reports.</a:t>
+            </a:r>
+          </a:p>
+        </p:txBody>
+      </p:sp>
     </p:spTree>
     <p:extLst>
       <p:ext uri="{BB962C8B-B14F-4D97-AF65-F5344CB8AC3E}">
@@ -5824,20 +5968,10 @@
         </p:nvSpPr>
         <p:spPr/>
         <p:txBody>
-          <a:bodyPr/>
+          <a:bodyPr>
+            <a:normAutofit/>
+          </a:bodyPr>
           <a:lstStyle/>
-          <a:p>
-            <a:r>
-              <a:rPr lang="en-US" dirty="0"/>
-              <a:t>The work of a data scientist isn’t limited to the set of tasks that are specific to the data analysis. </a:t>
-            </a:r>
-          </a:p>
-          <a:p>
-            <a:r>
-              <a:rPr lang="en-US" dirty="0"/>
-              <a:t>The typical workflow includes a number of additional tasks that might start at data creation/ingestion and end with the distribution/publishing of reports.</a:t>
-            </a:r>
-          </a:p>
           <a:p>
             <a:r>
               <a:rPr lang="en-US" dirty="0"/>
@@ -5851,6 +5985,65 @@
               <a:rPr lang="en-US" dirty="0"/>
               <a:t> be run without user intervention.</a:t>
             </a:r>
+          </a:p>
+          <a:p>
+            <a:r>
+              <a:rPr lang="en-US" dirty="0"/>
+              <a:t>An </a:t>
+            </a:r>
+            <a:r>
+              <a:rPr lang="en-US" b="1" i="1" u="sng" dirty="0"/>
+              <a:t>R</a:t>
+            </a:r>
+            <a:r>
+              <a:rPr lang="en-US" b="1" u="sng" dirty="0"/>
+              <a:t>-Bot</a:t>
+            </a:r>
+            <a:r>
+              <a:rPr lang="en-US" dirty="0"/>
+              <a:t> is an R script that executes one or more tasks in a data science workflow.</a:t>
+            </a:r>
+          </a:p>
+          <a:p>
+            <a:r>
+              <a:rPr lang="en-US" dirty="0"/>
+              <a:t>Examples:</a:t>
+            </a:r>
+          </a:p>
+          <a:p>
+            <a:pPr lvl="1"/>
+            <a:r>
+              <a:rPr lang="en-US" dirty="0"/>
+              <a:t>Data ingestion</a:t>
+            </a:r>
+          </a:p>
+          <a:p>
+            <a:pPr lvl="1"/>
+            <a:r>
+              <a:rPr lang="en-US" dirty="0"/>
+              <a:t>Create report with dynamically generated content</a:t>
+            </a:r>
+          </a:p>
+          <a:p>
+            <a:pPr lvl="1"/>
+            <a:r>
+              <a:rPr lang="en-US" dirty="0"/>
+              <a:t>Send emails</a:t>
+            </a:r>
+          </a:p>
+          <a:p>
+            <a:pPr lvl="1"/>
+            <a:r>
+              <a:rPr lang="en-US" dirty="0"/>
+              <a:t>Version control</a:t>
+            </a:r>
+          </a:p>
+          <a:p>
+            <a:pPr lvl="1"/>
+            <a:endParaRPr lang="en-US" dirty="0"/>
+          </a:p>
+          <a:p>
+            <a:endParaRPr lang="en-US" dirty="0"/>
           </a:p>
           <a:p>
             <a:endParaRPr lang="en-US" dirty="0"/>
@@ -6171,7 +6364,7 @@
         </p:nvSpPr>
         <p:spPr>
           <a:xfrm>
-            <a:off x="838200" y="1825625"/>
+            <a:off x="838200" y="1488741"/>
             <a:ext cx="10515600" cy="4671994"/>
           </a:xfrm>
         </p:spPr>
@@ -7989,7 +8182,7 @@
           <a:p>
             <a:r>
               <a:rPr lang="en-US" dirty="0"/>
-              <a:t>In enterprise setting, you may have limitations on which types of packages you can install on the server, so you may be limited to base R or system commands. </a:t>
+              <a:t>In enterprise setting, you may have limitations on which types of packages you can install on the server, so you may be limited to mostly base R or system commands. </a:t>
             </a:r>
           </a:p>
           <a:p>
@@ -8001,15 +8194,7 @@
           <a:p>
             <a:r>
               <a:rPr lang="en-US" dirty="0"/>
-              <a:t>In the demo, I give </a:t>
-            </a:r>
-            <a:r>
-              <a:rPr lang="en-US"/>
-              <a:t>an example of a workflow </a:t>
-            </a:r>
-            <a:r>
-              <a:rPr lang="en-US" dirty="0"/>
-              <a:t>created under this scenario.</a:t>
+              <a:t>In the demo, I give an example of a workflow created under this scenario.</a:t>
             </a:r>
           </a:p>
         </p:txBody>

</xml_diff>

<commit_message>
Analysis of 2016 Q2 Lending Club dataset
</commit_message>
<xml_diff>
--- a/slides/Sydeaka_Watson_EARL_2018_Workflow_Automation.pptx
+++ b/slides/Sydeaka_Watson_EARL_2018_Workflow_Automation.pptx
@@ -5,7 +5,7 @@
     <p:sldMasterId id="2147483684" r:id="rId1"/>
   </p:sldMasterIdLst>
   <p:notesMasterIdLst>
-    <p:notesMasterId r:id="rId17"/>
+    <p:notesMasterId r:id="rId18"/>
   </p:notesMasterIdLst>
   <p:sldIdLst>
     <p:sldId id="256" r:id="rId2"/>
@@ -16,13 +16,14 @@
     <p:sldId id="262" r:id="rId7"/>
     <p:sldId id="263" r:id="rId8"/>
     <p:sldId id="264" r:id="rId9"/>
-    <p:sldId id="265" r:id="rId10"/>
-    <p:sldId id="268" r:id="rId11"/>
-    <p:sldId id="272" r:id="rId12"/>
-    <p:sldId id="273" r:id="rId13"/>
-    <p:sldId id="266" r:id="rId14"/>
-    <p:sldId id="269" r:id="rId15"/>
-    <p:sldId id="271" r:id="rId16"/>
+    <p:sldId id="377" r:id="rId10"/>
+    <p:sldId id="265" r:id="rId11"/>
+    <p:sldId id="268" r:id="rId12"/>
+    <p:sldId id="272" r:id="rId13"/>
+    <p:sldId id="273" r:id="rId14"/>
+    <p:sldId id="266" r:id="rId15"/>
+    <p:sldId id="269" r:id="rId16"/>
+    <p:sldId id="271" r:id="rId17"/>
   </p:sldIdLst>
   <p:sldSz cx="12192000" cy="6858000"/>
   <p:notesSz cx="6858000" cy="9144000"/>
@@ -211,7 +212,7 @@
           <a:p>
             <a:fld id="{1056DE2E-A099-9E4F-B388-D0B65C2E8A5F}" type="datetimeFigureOut">
               <a:rPr lang="en-US" smtClean="0"/>
-              <a:t>10/18/18</a:t>
+              <a:t>11/7/18</a:t>
             </a:fld>
             <a:endParaRPr lang="en-US"/>
           </a:p>
@@ -795,7 +796,7 @@
           <a:p>
             <a:fld id="{1E0B824E-9E86-EB4D-B560-8CBEB7D5E0F5}" type="slidenum">
               <a:rPr lang="en-US" smtClean="0"/>
-              <a:t>11</a:t>
+              <a:t>12</a:t>
             </a:fld>
             <a:endParaRPr lang="en-US"/>
           </a:p>
@@ -1345,7 +1346,7 @@
           <a:p>
             <a:fld id="{78C73B09-5639-4F51-9EDB-083DFE102190}" type="datetimeFigureOut">
               <a:rPr lang="en-GB" smtClean="0"/>
-              <a:t>18/10/2018</a:t>
+              <a:t>07/11/2018</a:t>
             </a:fld>
             <a:endParaRPr lang="en-GB"/>
           </a:p>
@@ -1524,7 +1525,7 @@
           <a:p>
             <a:fld id="{78C73B09-5639-4F51-9EDB-083DFE102190}" type="datetimeFigureOut">
               <a:rPr lang="en-GB" smtClean="0"/>
-              <a:t>18/10/2018</a:t>
+              <a:t>07/11/2018</a:t>
             </a:fld>
             <a:endParaRPr lang="en-GB"/>
           </a:p>
@@ -1697,7 +1698,7 @@
           <a:p>
             <a:fld id="{78C73B09-5639-4F51-9EDB-083DFE102190}" type="datetimeFigureOut">
               <a:rPr lang="en-GB" smtClean="0"/>
-              <a:t>18/10/2018</a:t>
+              <a:t>07/11/2018</a:t>
             </a:fld>
             <a:endParaRPr lang="en-GB"/>
           </a:p>
@@ -1940,7 +1941,7 @@
           <a:p>
             <a:fld id="{78C73B09-5639-4F51-9EDB-083DFE102190}" type="datetimeFigureOut">
               <a:rPr lang="en-GB" smtClean="0"/>
-              <a:t>18/10/2018</a:t>
+              <a:t>07/11/2018</a:t>
             </a:fld>
             <a:endParaRPr lang="en-GB"/>
           </a:p>
@@ -2172,7 +2173,7 @@
           <a:p>
             <a:fld id="{78C73B09-5639-4F51-9EDB-083DFE102190}" type="datetimeFigureOut">
               <a:rPr lang="en-GB" smtClean="0"/>
-              <a:t>18/10/2018</a:t>
+              <a:t>07/11/2018</a:t>
             </a:fld>
             <a:endParaRPr lang="en-GB"/>
           </a:p>
@@ -2539,7 +2540,7 @@
           <a:p>
             <a:fld id="{78C73B09-5639-4F51-9EDB-083DFE102190}" type="datetimeFigureOut">
               <a:rPr lang="en-GB" smtClean="0"/>
-              <a:t>18/10/2018</a:t>
+              <a:t>07/11/2018</a:t>
             </a:fld>
             <a:endParaRPr lang="en-GB"/>
           </a:p>
@@ -2657,7 +2658,7 @@
           <a:p>
             <a:fld id="{78C73B09-5639-4F51-9EDB-083DFE102190}" type="datetimeFigureOut">
               <a:rPr lang="en-GB" smtClean="0"/>
-              <a:t>18/10/2018</a:t>
+              <a:t>07/11/2018</a:t>
             </a:fld>
             <a:endParaRPr lang="en-GB"/>
           </a:p>
@@ -2752,7 +2753,7 @@
           <a:p>
             <a:fld id="{78C73B09-5639-4F51-9EDB-083DFE102190}" type="datetimeFigureOut">
               <a:rPr lang="en-GB" smtClean="0"/>
-              <a:t>18/10/2018</a:t>
+              <a:t>07/11/2018</a:t>
             </a:fld>
             <a:endParaRPr lang="en-GB"/>
           </a:p>
@@ -3029,7 +3030,7 @@
           <a:p>
             <a:fld id="{78C73B09-5639-4F51-9EDB-083DFE102190}" type="datetimeFigureOut">
               <a:rPr lang="en-GB" smtClean="0"/>
-              <a:t>18/10/2018</a:t>
+              <a:t>07/11/2018</a:t>
             </a:fld>
             <a:endParaRPr lang="en-GB"/>
           </a:p>
@@ -3286,7 +3287,7 @@
           <a:p>
             <a:fld id="{78C73B09-5639-4F51-9EDB-083DFE102190}" type="datetimeFigureOut">
               <a:rPr lang="en-GB" smtClean="0"/>
-              <a:t>18/10/2018</a:t>
+              <a:t>07/11/2018</a:t>
             </a:fld>
             <a:endParaRPr lang="en-GB"/>
           </a:p>
@@ -3497,7 +3498,7 @@
           <a:p>
             <a:fld id="{78C73B09-5639-4F51-9EDB-083DFE102190}" type="datetimeFigureOut">
               <a:rPr lang="en-GB" smtClean="0"/>
-              <a:t>18/10/2018</a:t>
+              <a:t>07/11/2018</a:t>
             </a:fld>
             <a:endParaRPr lang="en-GB"/>
           </a:p>
@@ -4194,7 +4195,7 @@
           <p:cNvPr id="2" name="Title 1">
             <a:extLst>
               <a:ext uri="{FF2B5EF4-FFF2-40B4-BE49-F238E27FC236}">
-                <a16:creationId xmlns:a16="http://schemas.microsoft.com/office/drawing/2014/main" id="{91DE7701-EF12-9244-8683-D213CB4CDA44}"/>
+                <a16:creationId xmlns:a16="http://schemas.microsoft.com/office/drawing/2014/main" id="{4F909432-576F-DD4E-B149-428ED4C0B148}"/>
               </a:ext>
             </a:extLst>
           </p:cNvPr>
@@ -4212,7 +4213,7 @@
           <a:p>
             <a:r>
               <a:rPr lang="en-US" dirty="0"/>
-              <a:t>DEMO</a:t>
+              <a:t>Enterprise considerations</a:t>
             </a:r>
           </a:p>
         </p:txBody>
@@ -4222,7 +4223,7 @@
           <p:cNvPr id="3" name="Content Placeholder 2">
             <a:extLst>
               <a:ext uri="{FF2B5EF4-FFF2-40B4-BE49-F238E27FC236}">
-                <a16:creationId xmlns:a16="http://schemas.microsoft.com/office/drawing/2014/main" id="{18D3D842-E0C5-0B4C-A6A0-4A837A87F4ED}"/>
+                <a16:creationId xmlns:a16="http://schemas.microsoft.com/office/drawing/2014/main" id="{E3F3B1BE-0E0D-134F-86FD-854FF4BEAB9A}"/>
               </a:ext>
             </a:extLst>
           </p:cNvPr>
@@ -4238,31 +4239,21 @@
           <a:bodyPr/>
           <a:lstStyle/>
           <a:p>
+            <a:r>
+              <a:rPr lang="en-US" dirty="0"/>
+              <a:t>In enterprise setting, you may have limitations on which types of packages you can install on the server, so you may be limited to mostly base R or system commands. </a:t>
+            </a:r>
+          </a:p>
+          <a:p>
             <a:pPr marL="0" indent="0">
               <a:buNone/>
             </a:pPr>
-            <a:r>
-              <a:rPr lang="en-US" dirty="0"/>
-              <a:t>Example is available in my public repository: </a:t>
-            </a:r>
-          </a:p>
-          <a:p>
-            <a:pPr marL="0" indent="0">
-              <a:buNone/>
-            </a:pPr>
-            <a:r>
-              <a:rPr lang="en-US" dirty="0"/>
-              <a:t> </a:t>
-            </a:r>
-            <a:r>
-              <a:rPr lang="en-US" dirty="0">
-                <a:hlinkClick r:id="rId2"/>
-              </a:rPr>
-              <a:t>https://github.com/sydeaka/workflow-automation</a:t>
-            </a:r>
-            <a:r>
-              <a:rPr lang="en-US" dirty="0"/>
-              <a:t> </a:t>
+            <a:endParaRPr lang="en-US" dirty="0"/>
+          </a:p>
+          <a:p>
+            <a:r>
+              <a:rPr lang="en-US" dirty="0"/>
+              <a:t>In the demo, I give an example of a workflow created under this scenario.</a:t>
             </a:r>
           </a:p>
         </p:txBody>
@@ -4270,7 +4261,7 @@
     </p:spTree>
     <p:extLst>
       <p:ext uri="{BB962C8B-B14F-4D97-AF65-F5344CB8AC3E}">
-        <p14:creationId xmlns:p14="http://schemas.microsoft.com/office/powerpoint/2010/main" val="909427575"/>
+        <p14:creationId xmlns:p14="http://schemas.microsoft.com/office/powerpoint/2010/main" val="4241006663"/>
       </p:ext>
     </p:extLst>
   </p:cSld>
@@ -4302,7 +4293,7 @@
           <p:cNvPr id="2" name="Title 1">
             <a:extLst>
               <a:ext uri="{FF2B5EF4-FFF2-40B4-BE49-F238E27FC236}">
-                <a16:creationId xmlns:a16="http://schemas.microsoft.com/office/drawing/2014/main" id="{2F33E213-1ECE-E745-8E60-3C9C7D634085}"/>
+                <a16:creationId xmlns:a16="http://schemas.microsoft.com/office/drawing/2014/main" id="{91DE7701-EF12-9244-8683-D213CB4CDA44}"/>
               </a:ext>
             </a:extLst>
           </p:cNvPr>
@@ -4320,7 +4311,7 @@
           <a:p>
             <a:r>
               <a:rPr lang="en-US" dirty="0"/>
-              <a:t>DEMO: Instructions</a:t>
+              <a:t>DEMO</a:t>
             </a:r>
           </a:p>
         </p:txBody>
@@ -4330,7 +4321,7 @@
           <p:cNvPr id="3" name="Content Placeholder 2">
             <a:extLst>
               <a:ext uri="{FF2B5EF4-FFF2-40B4-BE49-F238E27FC236}">
-                <a16:creationId xmlns:a16="http://schemas.microsoft.com/office/drawing/2014/main" id="{70CB7CA0-87C1-7A47-9CC9-C1A7A6021127}"/>
+                <a16:creationId xmlns:a16="http://schemas.microsoft.com/office/drawing/2014/main" id="{18D3D842-E0C5-0B4C-A6A0-4A837A87F4ED}"/>
               </a:ext>
             </a:extLst>
           </p:cNvPr>
@@ -4341,212 +4332,44 @@
             <p:ph idx="1"/>
           </p:nvPr>
         </p:nvSpPr>
-        <p:spPr>
-          <a:xfrm>
-            <a:off x="838200" y="1420010"/>
-            <a:ext cx="10515600" cy="5303519"/>
-          </a:xfrm>
-        </p:spPr>
-        <p:txBody>
-          <a:bodyPr>
-            <a:normAutofit fontScale="92500" lnSpcReduction="20000"/>
-          </a:bodyPr>
+        <p:spPr/>
+        <p:txBody>
+          <a:bodyPr/>
           <a:lstStyle/>
-          <a:p>
-            <a:r>
-              <a:rPr lang="en-US" dirty="0"/>
-              <a:t>System requirements</a:t>
-            </a:r>
-          </a:p>
-          <a:p>
-            <a:pPr lvl="1"/>
-            <a:r>
-              <a:rPr lang="en-US" dirty="0"/>
-              <a:t>Mac / Linux operating system</a:t>
-            </a:r>
-          </a:p>
-          <a:p>
-            <a:pPr lvl="1"/>
-            <a:r>
-              <a:rPr lang="en-US" dirty="0"/>
-              <a:t>MYSQL (optional)</a:t>
-            </a:r>
-          </a:p>
-          <a:p>
-            <a:pPr lvl="2"/>
-            <a:r>
-              <a:rPr lang="en-US" dirty="0"/>
-              <a:t>If you have MYSQL installed, set </a:t>
-            </a:r>
-            <a:r>
-              <a:rPr lang="en-US" dirty="0" err="1"/>
-              <a:t>use_mysql</a:t>
-            </a:r>
-            <a:r>
-              <a:rPr lang="en-US" dirty="0"/>
-              <a:t>=TRUE and create a credentials file in your system’s home directory. The file should contain two lines: </a:t>
-            </a:r>
-          </a:p>
-          <a:p>
-            <a:pPr marL="914400" lvl="2" indent="0">
-              <a:buNone/>
-            </a:pPr>
-            <a:endParaRPr lang="en-US" dirty="0"/>
-          </a:p>
-          <a:p>
-            <a:pPr marL="3657600" lvl="8" indent="0">
-              <a:buNone/>
-            </a:pPr>
-            <a:r>
-              <a:rPr lang="en-US" dirty="0"/>
-              <a:t>username=</a:t>
-            </a:r>
-            <a:r>
-              <a:rPr lang="en-US" dirty="0" err="1"/>
-              <a:t>YourUserName</a:t>
-            </a:r>
-            <a:r>
-              <a:rPr lang="en-US" dirty="0"/>
-              <a:t> </a:t>
-            </a:r>
-          </a:p>
-          <a:p>
-            <a:pPr marL="3657600" lvl="8" indent="0">
-              <a:buNone/>
-            </a:pPr>
-            <a:r>
-              <a:rPr lang="en-US" dirty="0"/>
-              <a:t>password=</a:t>
-            </a:r>
-            <a:r>
-              <a:rPr lang="en-US" dirty="0" err="1"/>
-              <a:t>YourPassword</a:t>
-            </a:r>
-            <a:endParaRPr lang="en-US" dirty="0"/>
-          </a:p>
-          <a:p>
-            <a:pPr marL="3657600" lvl="8" indent="0">
-              <a:buNone/>
-            </a:pPr>
-            <a:endParaRPr lang="en-US" dirty="0"/>
-          </a:p>
-          <a:p>
-            <a:pPr lvl="2"/>
-            <a:r>
-              <a:rPr lang="en-US" dirty="0"/>
-              <a:t>If not, set </a:t>
-            </a:r>
-            <a:r>
-              <a:rPr lang="en-US" dirty="0" err="1"/>
-              <a:t>use_mysql</a:t>
-            </a:r>
-            <a:r>
-              <a:rPr lang="en-US" dirty="0"/>
-              <a:t>=FALSE to run without MYSQL</a:t>
-            </a:r>
-          </a:p>
-          <a:p>
-            <a:r>
-              <a:rPr lang="en-US" dirty="0"/>
-              <a:t>To run</a:t>
-            </a:r>
-          </a:p>
-          <a:p>
-            <a:pPr lvl="1"/>
-            <a:r>
-              <a:rPr lang="en-US" dirty="0"/>
-              <a:t>navigate to the top-level directory in the repository in your terminal</a:t>
-            </a:r>
-          </a:p>
-          <a:p>
-            <a:pPr lvl="1"/>
-            <a:r>
-              <a:rPr lang="en-US" dirty="0"/>
-              <a:t>modify working directory at top of “</a:t>
-            </a:r>
-            <a:r>
-              <a:rPr lang="en-US" dirty="0" err="1"/>
-              <a:t>mysql_example.sh</a:t>
-            </a:r>
-            <a:r>
-              <a:rPr lang="en-US" dirty="0"/>
-              <a:t>” file</a:t>
-            </a:r>
-          </a:p>
-          <a:p>
-            <a:pPr lvl="1"/>
-            <a:r>
-              <a:rPr lang="en-US" dirty="0"/>
-              <a:t>modify from/to email addresses in </a:t>
-            </a:r>
-            <a:r>
-              <a:rPr lang="en-US" dirty="0" err="1"/>
-              <a:t>email.R</a:t>
-            </a:r>
-            <a:r>
-              <a:rPr lang="en-US" dirty="0"/>
-              <a:t>, and create “</a:t>
-            </a:r>
-            <a:r>
-              <a:rPr lang="en-US" dirty="0" err="1"/>
-              <a:t>gmail.txt</a:t>
-            </a:r>
-            <a:r>
-              <a:rPr lang="en-US" dirty="0"/>
-              <a:t>” file in system home directory (file just contains your password as raw text, no quotes)</a:t>
-            </a:r>
-          </a:p>
-          <a:p>
-            <a:pPr lvl="1"/>
-            <a:r>
-              <a:rPr lang="en-US" dirty="0"/>
-              <a:t>execute the following:</a:t>
-            </a:r>
-          </a:p>
           <a:p>
             <a:pPr marL="0" indent="0">
               <a:buNone/>
             </a:pPr>
             <a:r>
+              <a:rPr lang="en-US" dirty="0"/>
+              <a:t>Example is available in my public repository: </a:t>
+            </a:r>
+          </a:p>
+          <a:p>
+            <a:pPr marL="0" indent="0">
+              <a:buNone/>
+            </a:pPr>
+            <a:r>
+              <a:rPr lang="en-US" dirty="0"/>
+              <a:t> </a:t>
+            </a:r>
+            <a:r>
               <a:rPr lang="en-US" dirty="0">
-                <a:latin typeface="Courier New" panose="02070309020205020404" pitchFamily="49" charset="0"/>
-                <a:cs typeface="Courier New" panose="02070309020205020404" pitchFamily="49" charset="0"/>
+                <a:hlinkClick r:id="rId2"/>
               </a:rPr>
-              <a:t>			   </a:t>
-            </a:r>
-            <a:r>
-              <a:rPr lang="en-US" b="1" dirty="0">
-                <a:latin typeface="Courier New" panose="02070309020205020404" pitchFamily="49" charset="0"/>
-                <a:cs typeface="Courier New" panose="02070309020205020404" pitchFamily="49" charset="0"/>
-              </a:rPr>
-              <a:t>./</a:t>
-            </a:r>
-            <a:r>
-              <a:rPr lang="en-US" b="1" dirty="0" err="1">
-                <a:latin typeface="Courier New" panose="02070309020205020404" pitchFamily="49" charset="0"/>
-                <a:cs typeface="Courier New" panose="02070309020205020404" pitchFamily="49" charset="0"/>
-              </a:rPr>
-              <a:t>mysql_example.sh</a:t>
-            </a:r>
-            <a:endParaRPr lang="en-US" b="1" dirty="0"/>
-          </a:p>
-          <a:p>
-            <a:pPr lvl="1"/>
-            <a:endParaRPr lang="en-US" dirty="0"/>
-          </a:p>
-          <a:p>
-            <a:pPr lvl="1"/>
-            <a:endParaRPr lang="en-US" dirty="0"/>
-          </a:p>
-          <a:p>
-            <a:endParaRPr lang="en-US" dirty="0"/>
+              <a:t>https://github.com/sydeaka/workflow-automation</a:t>
+            </a:r>
+            <a:r>
+              <a:rPr lang="en-US" dirty="0"/>
+              <a:t> </a:t>
+            </a:r>
           </a:p>
         </p:txBody>
       </p:sp>
     </p:spTree>
     <p:extLst>
       <p:ext uri="{BB962C8B-B14F-4D97-AF65-F5344CB8AC3E}">
-        <p14:creationId xmlns:p14="http://schemas.microsoft.com/office/powerpoint/2010/main" val="1554562189"/>
+        <p14:creationId xmlns:p14="http://schemas.microsoft.com/office/powerpoint/2010/main" val="909427575"/>
       </p:ext>
     </p:extLst>
   </p:cSld>
@@ -4578,6 +4401,282 @@
           <p:cNvPr id="2" name="Title 1">
             <a:extLst>
               <a:ext uri="{FF2B5EF4-FFF2-40B4-BE49-F238E27FC236}">
+                <a16:creationId xmlns:a16="http://schemas.microsoft.com/office/drawing/2014/main" id="{2F33E213-1ECE-E745-8E60-3C9C7D634085}"/>
+              </a:ext>
+            </a:extLst>
+          </p:cNvPr>
+          <p:cNvSpPr>
+            <a:spLocks noGrp="1"/>
+          </p:cNvSpPr>
+          <p:nvPr>
+            <p:ph type="title"/>
+          </p:nvPr>
+        </p:nvSpPr>
+        <p:spPr/>
+        <p:txBody>
+          <a:bodyPr/>
+          <a:lstStyle/>
+          <a:p>
+            <a:r>
+              <a:rPr lang="en-US" dirty="0"/>
+              <a:t>DEMO: Instructions</a:t>
+            </a:r>
+          </a:p>
+        </p:txBody>
+      </p:sp>
+      <p:sp>
+        <p:nvSpPr>
+          <p:cNvPr id="3" name="Content Placeholder 2">
+            <a:extLst>
+              <a:ext uri="{FF2B5EF4-FFF2-40B4-BE49-F238E27FC236}">
+                <a16:creationId xmlns:a16="http://schemas.microsoft.com/office/drawing/2014/main" id="{70CB7CA0-87C1-7A47-9CC9-C1A7A6021127}"/>
+              </a:ext>
+            </a:extLst>
+          </p:cNvPr>
+          <p:cNvSpPr>
+            <a:spLocks noGrp="1"/>
+          </p:cNvSpPr>
+          <p:nvPr>
+            <p:ph idx="1"/>
+          </p:nvPr>
+        </p:nvSpPr>
+        <p:spPr>
+          <a:xfrm>
+            <a:off x="838200" y="1420010"/>
+            <a:ext cx="10515600" cy="5303519"/>
+          </a:xfrm>
+        </p:spPr>
+        <p:txBody>
+          <a:bodyPr>
+            <a:normAutofit fontScale="92500" lnSpcReduction="20000"/>
+          </a:bodyPr>
+          <a:lstStyle/>
+          <a:p>
+            <a:r>
+              <a:rPr lang="en-US" dirty="0"/>
+              <a:t>System requirements</a:t>
+            </a:r>
+          </a:p>
+          <a:p>
+            <a:pPr lvl="1"/>
+            <a:r>
+              <a:rPr lang="en-US" dirty="0"/>
+              <a:t>Mac / Linux operating system</a:t>
+            </a:r>
+          </a:p>
+          <a:p>
+            <a:pPr lvl="1"/>
+            <a:r>
+              <a:rPr lang="en-US" dirty="0"/>
+              <a:t>MYSQL (optional)</a:t>
+            </a:r>
+          </a:p>
+          <a:p>
+            <a:pPr lvl="2"/>
+            <a:r>
+              <a:rPr lang="en-US" dirty="0"/>
+              <a:t>If you have MYSQL installed, set </a:t>
+            </a:r>
+            <a:r>
+              <a:rPr lang="en-US" dirty="0" err="1"/>
+              <a:t>use_mysql</a:t>
+            </a:r>
+            <a:r>
+              <a:rPr lang="en-US" dirty="0"/>
+              <a:t>=TRUE and create a credentials file in your system’s home directory. The file should contain two lines: </a:t>
+            </a:r>
+          </a:p>
+          <a:p>
+            <a:pPr marL="914400" lvl="2" indent="0">
+              <a:buNone/>
+            </a:pPr>
+            <a:endParaRPr lang="en-US" dirty="0"/>
+          </a:p>
+          <a:p>
+            <a:pPr marL="3657600" lvl="8" indent="0">
+              <a:buNone/>
+            </a:pPr>
+            <a:r>
+              <a:rPr lang="en-US" dirty="0"/>
+              <a:t>username=</a:t>
+            </a:r>
+            <a:r>
+              <a:rPr lang="en-US" dirty="0" err="1"/>
+              <a:t>YourUserName</a:t>
+            </a:r>
+            <a:r>
+              <a:rPr lang="en-US" dirty="0"/>
+              <a:t> </a:t>
+            </a:r>
+          </a:p>
+          <a:p>
+            <a:pPr marL="3657600" lvl="8" indent="0">
+              <a:buNone/>
+            </a:pPr>
+            <a:r>
+              <a:rPr lang="en-US" dirty="0"/>
+              <a:t>password=</a:t>
+            </a:r>
+            <a:r>
+              <a:rPr lang="en-US" dirty="0" err="1"/>
+              <a:t>YourPassword</a:t>
+            </a:r>
+            <a:endParaRPr lang="en-US" dirty="0"/>
+          </a:p>
+          <a:p>
+            <a:pPr marL="3657600" lvl="8" indent="0">
+              <a:buNone/>
+            </a:pPr>
+            <a:endParaRPr lang="en-US" dirty="0"/>
+          </a:p>
+          <a:p>
+            <a:pPr lvl="2"/>
+            <a:r>
+              <a:rPr lang="en-US" dirty="0"/>
+              <a:t>If not, set </a:t>
+            </a:r>
+            <a:r>
+              <a:rPr lang="en-US" dirty="0" err="1"/>
+              <a:t>use_mysql</a:t>
+            </a:r>
+            <a:r>
+              <a:rPr lang="en-US" dirty="0"/>
+              <a:t>=FALSE to run without MYSQL</a:t>
+            </a:r>
+          </a:p>
+          <a:p>
+            <a:r>
+              <a:rPr lang="en-US" dirty="0"/>
+              <a:t>To run</a:t>
+            </a:r>
+          </a:p>
+          <a:p>
+            <a:pPr lvl="1"/>
+            <a:r>
+              <a:rPr lang="en-US" dirty="0"/>
+              <a:t>navigate to the top-level directory in the repository in your terminal</a:t>
+            </a:r>
+          </a:p>
+          <a:p>
+            <a:pPr lvl="1"/>
+            <a:r>
+              <a:rPr lang="en-US" dirty="0"/>
+              <a:t>modify working directory at top of “</a:t>
+            </a:r>
+            <a:r>
+              <a:rPr lang="en-US" dirty="0" err="1"/>
+              <a:t>mysql_example.sh</a:t>
+            </a:r>
+            <a:r>
+              <a:rPr lang="en-US" dirty="0"/>
+              <a:t>” file</a:t>
+            </a:r>
+          </a:p>
+          <a:p>
+            <a:pPr lvl="1"/>
+            <a:r>
+              <a:rPr lang="en-US" dirty="0"/>
+              <a:t>modify from/to email addresses in </a:t>
+            </a:r>
+            <a:r>
+              <a:rPr lang="en-US" dirty="0" err="1"/>
+              <a:t>email.R</a:t>
+            </a:r>
+            <a:r>
+              <a:rPr lang="en-US" dirty="0"/>
+              <a:t>, and create “</a:t>
+            </a:r>
+            <a:r>
+              <a:rPr lang="en-US" dirty="0" err="1"/>
+              <a:t>gmail.txt</a:t>
+            </a:r>
+            <a:r>
+              <a:rPr lang="en-US" dirty="0"/>
+              <a:t>” file in system home directory (file just contains your password as raw text, no quotes)</a:t>
+            </a:r>
+          </a:p>
+          <a:p>
+            <a:pPr lvl="1"/>
+            <a:r>
+              <a:rPr lang="en-US" dirty="0"/>
+              <a:t>execute the following:</a:t>
+            </a:r>
+          </a:p>
+          <a:p>
+            <a:pPr marL="0" indent="0">
+              <a:buNone/>
+            </a:pPr>
+            <a:r>
+              <a:rPr lang="en-US" dirty="0">
+                <a:latin typeface="Courier New" panose="02070309020205020404" pitchFamily="49" charset="0"/>
+                <a:cs typeface="Courier New" panose="02070309020205020404" pitchFamily="49" charset="0"/>
+              </a:rPr>
+              <a:t>			   </a:t>
+            </a:r>
+            <a:r>
+              <a:rPr lang="en-US" b="1" dirty="0">
+                <a:latin typeface="Courier New" panose="02070309020205020404" pitchFamily="49" charset="0"/>
+                <a:cs typeface="Courier New" panose="02070309020205020404" pitchFamily="49" charset="0"/>
+              </a:rPr>
+              <a:t>./</a:t>
+            </a:r>
+            <a:r>
+              <a:rPr lang="en-US" b="1" dirty="0" err="1">
+                <a:latin typeface="Courier New" panose="02070309020205020404" pitchFamily="49" charset="0"/>
+                <a:cs typeface="Courier New" panose="02070309020205020404" pitchFamily="49" charset="0"/>
+              </a:rPr>
+              <a:t>mysql_example.sh</a:t>
+            </a:r>
+            <a:endParaRPr lang="en-US" b="1" dirty="0"/>
+          </a:p>
+          <a:p>
+            <a:pPr lvl="1"/>
+            <a:endParaRPr lang="en-US" dirty="0"/>
+          </a:p>
+          <a:p>
+            <a:pPr lvl="1"/>
+            <a:endParaRPr lang="en-US" dirty="0"/>
+          </a:p>
+          <a:p>
+            <a:endParaRPr lang="en-US" dirty="0"/>
+          </a:p>
+        </p:txBody>
+      </p:sp>
+    </p:spTree>
+    <p:extLst>
+      <p:ext uri="{BB962C8B-B14F-4D97-AF65-F5344CB8AC3E}">
+        <p14:creationId xmlns:p14="http://schemas.microsoft.com/office/powerpoint/2010/main" val="1554562189"/>
+      </p:ext>
+    </p:extLst>
+  </p:cSld>
+  <p:clrMapOvr>
+    <a:masterClrMapping/>
+  </p:clrMapOvr>
+</p:sld>
+</file>
+
+<file path=ppt/slides/slide13.xml><?xml version="1.0" encoding="utf-8"?>
+<p:sld xmlns:a="http://schemas.openxmlformats.org/drawingml/2006/main" xmlns:r="http://schemas.openxmlformats.org/officeDocument/2006/relationships" xmlns:p="http://schemas.openxmlformats.org/presentationml/2006/main">
+  <p:cSld>
+    <p:spTree>
+      <p:nvGrpSpPr>
+        <p:cNvPr id="1" name=""/>
+        <p:cNvGrpSpPr/>
+        <p:nvPr/>
+      </p:nvGrpSpPr>
+      <p:grpSpPr>
+        <a:xfrm>
+          <a:off x="0" y="0"/>
+          <a:ext cx="0" cy="0"/>
+          <a:chOff x="0" y="0"/>
+          <a:chExt cx="0" cy="0"/>
+        </a:xfrm>
+      </p:grpSpPr>
+      <p:sp>
+        <p:nvSpPr>
+          <p:cNvPr id="2" name="Title 1">
+            <a:extLst>
+              <a:ext uri="{FF2B5EF4-FFF2-40B4-BE49-F238E27FC236}">
                 <a16:creationId xmlns:a16="http://schemas.microsoft.com/office/drawing/2014/main" id="{026D2B04-8B5E-E54D-BE4F-6508E8FCC192}"/>
               </a:ext>
             </a:extLst>
@@ -4625,14 +4724,14 @@
             <p:ph idx="1"/>
             <p:extLst>
               <p:ext uri="{D42A27DB-BD31-4B8C-83A1-F6EECF244321}">
-                <p14:modId xmlns:p14="http://schemas.microsoft.com/office/powerpoint/2010/main" val="1162851732"/>
+                <p14:modId xmlns:p14="http://schemas.microsoft.com/office/powerpoint/2010/main" val="2091386602"/>
               </p:ext>
             </p:extLst>
           </p:nvPr>
         </p:nvGraphicFramePr>
         <p:xfrm>
-          <a:off x="209027" y="1268318"/>
-          <a:ext cx="11773945" cy="4662588"/>
+          <a:off x="209027" y="1424704"/>
+          <a:ext cx="11773945" cy="5302668"/>
         </p:xfrm>
         <a:graphic>
           <a:graphicData uri="http://schemas.openxmlformats.org/drawingml/2006/table">
@@ -4761,51 +4860,28 @@
                     <a:bodyPr/>
                     <a:lstStyle/>
                     <a:p>
+                      <a:pPr marL="0" marR="0" lvl="0" indent="0" algn="l" defTabSz="914400" rtl="0" eaLnBrk="1" fontAlgn="auto" latinLnBrk="0" hangingPunct="1">
+                        <a:lnSpc>
+                          <a:spcPct val="100000"/>
+                        </a:lnSpc>
+                        <a:spcBef>
+                          <a:spcPts val="0"/>
+                        </a:spcBef>
+                        <a:spcAft>
+                          <a:spcPts val="0"/>
+                        </a:spcAft>
+                        <a:buClrTx/>
+                        <a:buSzTx/>
+                        <a:buFontTx/>
+                        <a:buNone/>
+                        <a:tabLst/>
+                        <a:defRPr/>
+                      </a:pPr>
                       <a:r>
                         <a:rPr lang="en-US" sz="1800" dirty="0"/>
                         <a:t>data</a:t>
                       </a:r>
                     </a:p>
-                  </a:txBody>
-                  <a:tcPr/>
-                </a:tc>
-                <a:tc>
-                  <a:txBody>
-                    <a:bodyPr/>
-                    <a:lstStyle/>
-                    <a:p>
-                      <a:r>
-                        <a:rPr lang="en-US" sz="1800" dirty="0"/>
-                        <a:t>bash</a:t>
-                      </a:r>
-                    </a:p>
-                  </a:txBody>
-                  <a:tcPr/>
-                </a:tc>
-                <a:tc>
-                  <a:txBody>
-                    <a:bodyPr/>
-                    <a:lstStyle/>
-                    <a:p>
-                      <a:r>
-                        <a:rPr lang="en-US" sz="1800" dirty="0"/>
-                        <a:t>Bash scripts</a:t>
-                      </a:r>
-                    </a:p>
-                  </a:txBody>
-                  <a:tcPr/>
-                </a:tc>
-                <a:extLst>
-                  <a:ext uri="{0D108BD9-81ED-4DB2-BD59-A6C34878D82A}">
-                    <a16:rowId xmlns:a16="http://schemas.microsoft.com/office/drawing/2014/main" val="573876612"/>
-                  </a:ext>
-                </a:extLst>
-              </a:tr>
-              <a:tr h="388549">
-                <a:tc>
-                  <a:txBody>
-                    <a:bodyPr/>
-                    <a:lstStyle/>
                     <a:p>
                       <a:endParaRPr lang="en-US" sz="1800" dirty="0"/>
                     </a:p>
@@ -5113,6 +5189,50 @@
                     <a:lstStyle/>
                     <a:p>
                       <a:r>
+                        <a:rPr lang="en-US" sz="1800" dirty="0" err="1"/>
+                        <a:t>R_bots</a:t>
+                      </a:r>
+                      <a:endParaRPr lang="en-US" sz="1800" dirty="0"/>
+                    </a:p>
+                  </a:txBody>
+                  <a:tcPr/>
+                </a:tc>
+                <a:tc>
+                  <a:txBody>
+                    <a:bodyPr/>
+                    <a:lstStyle/>
+                    <a:p>
+                      <a:endParaRPr lang="en-US" sz="1800" dirty="0"/>
+                    </a:p>
+                  </a:txBody>
+                  <a:tcPr/>
+                </a:tc>
+                <a:tc>
+                  <a:txBody>
+                    <a:bodyPr/>
+                    <a:lstStyle/>
+                    <a:p>
+                      <a:r>
+                        <a:rPr lang="en-US" sz="1800" dirty="0"/>
+                        <a:t>R-scripts executed in the workflow</a:t>
+                      </a:r>
+                    </a:p>
+                  </a:txBody>
+                  <a:tcPr/>
+                </a:tc>
+                <a:extLst>
+                  <a:ext uri="{0D108BD9-81ED-4DB2-BD59-A6C34878D82A}">
+                    <a16:rowId xmlns:a16="http://schemas.microsoft.com/office/drawing/2014/main" val="812221320"/>
+                  </a:ext>
+                </a:extLst>
+              </a:tr>
+              <a:tr h="388549">
+                <a:tc>
+                  <a:txBody>
+                    <a:bodyPr/>
+                    <a:lstStyle/>
+                    <a:p>
+                      <a:r>
                         <a:rPr lang="en-US" sz="1800" dirty="0"/>
                         <a:t>reports</a:t>
                       </a:r>
@@ -5136,12 +5256,8 @@
                     <a:lstStyle/>
                     <a:p>
                       <a:r>
-                        <a:rPr lang="en-US" sz="1800" dirty="0" err="1"/>
-                        <a:t>Rmarkdown</a:t>
-                      </a:r>
-                      <a:r>
                         <a:rPr lang="en-US" sz="1800" dirty="0"/>
-                        <a:t> files + rendered reports (HTML/Markdown formats)</a:t>
+                        <a:t>Rmarkdown files + rendered reports (HTML/Markdown formats)</a:t>
                       </a:r>
                     </a:p>
                   </a:txBody>
@@ -5150,6 +5266,49 @@
                 <a:extLst>
                   <a:ext uri="{0D108BD9-81ED-4DB2-BD59-A6C34878D82A}">
                     <a16:rowId xmlns:a16="http://schemas.microsoft.com/office/drawing/2014/main" val="1299990883"/>
+                  </a:ext>
+                </a:extLst>
+              </a:tr>
+              <a:tr h="388549">
+                <a:tc>
+                  <a:txBody>
+                    <a:bodyPr/>
+                    <a:lstStyle/>
+                    <a:p>
+                      <a:r>
+                        <a:rPr lang="en-US" sz="1800" dirty="0"/>
+                        <a:t>slides</a:t>
+                      </a:r>
+                    </a:p>
+                  </a:txBody>
+                  <a:tcPr/>
+                </a:tc>
+                <a:tc>
+                  <a:txBody>
+                    <a:bodyPr/>
+                    <a:lstStyle/>
+                    <a:p>
+                      <a:endParaRPr lang="en-US" sz="1800" dirty="0"/>
+                    </a:p>
+                  </a:txBody>
+                  <a:tcPr/>
+                </a:tc>
+                <a:tc>
+                  <a:txBody>
+                    <a:bodyPr/>
+                    <a:lstStyle/>
+                    <a:p>
+                      <a:r>
+                        <a:rPr lang="en-US" sz="1800" dirty="0"/>
+                        <a:t>PPT and PDF of presentation</a:t>
+                      </a:r>
+                    </a:p>
+                  </a:txBody>
+                  <a:tcPr/>
+                </a:tc>
+                <a:extLst>
+                  <a:ext uri="{0D108BD9-81ED-4DB2-BD59-A6C34878D82A}">
+                    <a16:rowId xmlns:a16="http://schemas.microsoft.com/office/drawing/2014/main" val="78086803"/>
                   </a:ext>
                 </a:extLst>
               </a:tr>
@@ -5185,7 +5344,7 @@
                     <a:p>
                       <a:r>
                         <a:rPr lang="en-US" sz="1800" dirty="0"/>
-                        <a:t>R scripts</a:t>
+                        <a:t>Re-usable utilities that could be used in other projects</a:t>
                       </a:r>
                     </a:p>
                   </a:txBody>
@@ -5214,222 +5373,6 @@
 </p:sld>
 </file>
 
-<file path=ppt/slides/slide13.xml><?xml version="1.0" encoding="utf-8"?>
-<p:sld xmlns:a="http://schemas.openxmlformats.org/drawingml/2006/main" xmlns:r="http://schemas.openxmlformats.org/officeDocument/2006/relationships" xmlns:p="http://schemas.openxmlformats.org/presentationml/2006/main">
-  <p:cSld>
-    <p:spTree>
-      <p:nvGrpSpPr>
-        <p:cNvPr id="1" name=""/>
-        <p:cNvGrpSpPr/>
-        <p:nvPr/>
-      </p:nvGrpSpPr>
-      <p:grpSpPr>
-        <a:xfrm>
-          <a:off x="0" y="0"/>
-          <a:ext cx="0" cy="0"/>
-          <a:chOff x="0" y="0"/>
-          <a:chExt cx="0" cy="0"/>
-        </a:xfrm>
-      </p:grpSpPr>
-      <p:sp>
-        <p:nvSpPr>
-          <p:cNvPr id="2" name="Title 1">
-            <a:extLst>
-              <a:ext uri="{FF2B5EF4-FFF2-40B4-BE49-F238E27FC236}">
-                <a16:creationId xmlns:a16="http://schemas.microsoft.com/office/drawing/2014/main" id="{156B4F97-C8DC-884B-BE50-CAA56A351B04}"/>
-              </a:ext>
-            </a:extLst>
-          </p:cNvPr>
-          <p:cNvSpPr>
-            <a:spLocks noGrp="1"/>
-          </p:cNvSpPr>
-          <p:nvPr>
-            <p:ph type="title"/>
-          </p:nvPr>
-        </p:nvSpPr>
-        <p:spPr/>
-        <p:txBody>
-          <a:bodyPr/>
-          <a:lstStyle/>
-          <a:p>
-            <a:r>
-              <a:rPr lang="en-US" dirty="0"/>
-              <a:t>DEMO: Skeleton of </a:t>
-            </a:r>
-            <a:r>
-              <a:rPr lang="en-US" b="1" dirty="0" err="1">
-                <a:latin typeface="Courier New" panose="02070309020205020404" pitchFamily="49" charset="0"/>
-                <a:cs typeface="Courier New" panose="02070309020205020404" pitchFamily="49" charset="0"/>
-              </a:rPr>
-              <a:t>mysql_example.sh</a:t>
-            </a:r>
-            <a:endParaRPr lang="en-US" b="1" dirty="0">
-              <a:latin typeface="Courier New" panose="02070309020205020404" pitchFamily="49" charset="0"/>
-              <a:cs typeface="Courier New" panose="02070309020205020404" pitchFamily="49" charset="0"/>
-            </a:endParaRPr>
-          </a:p>
-        </p:txBody>
-      </p:sp>
-      <p:sp>
-        <p:nvSpPr>
-          <p:cNvPr id="3" name="Content Placeholder 2">
-            <a:extLst>
-              <a:ext uri="{FF2B5EF4-FFF2-40B4-BE49-F238E27FC236}">
-                <a16:creationId xmlns:a16="http://schemas.microsoft.com/office/drawing/2014/main" id="{BF5DC333-5F7D-074F-9393-5C73E060AA16}"/>
-              </a:ext>
-            </a:extLst>
-          </p:cNvPr>
-          <p:cNvSpPr>
-            <a:spLocks noGrp="1"/>
-          </p:cNvSpPr>
-          <p:nvPr>
-            <p:ph idx="1"/>
-          </p:nvPr>
-        </p:nvSpPr>
-        <p:spPr>
-          <a:xfrm>
-            <a:off x="838200" y="1449106"/>
-            <a:ext cx="10515600" cy="5252907"/>
-          </a:xfrm>
-        </p:spPr>
-        <p:txBody>
-          <a:bodyPr>
-            <a:normAutofit fontScale="92500" lnSpcReduction="20000"/>
-          </a:bodyPr>
-          <a:lstStyle/>
-          <a:p>
-            <a:pPr marL="514350" indent="-514350">
-              <a:buFont typeface="+mj-lt"/>
-              <a:buAutoNum type="arabicPeriod"/>
-            </a:pPr>
-            <a:r>
-              <a:rPr lang="en-US" dirty="0"/>
-              <a:t>Read in MYSQL credentials and set session parameters</a:t>
-            </a:r>
-          </a:p>
-          <a:p>
-            <a:pPr marL="514350" indent="-514350">
-              <a:buFont typeface="+mj-lt"/>
-              <a:buAutoNum type="arabicPeriod"/>
-            </a:pPr>
-            <a:r>
-              <a:rPr lang="en-US" dirty="0"/>
-              <a:t>Download dataset for selected year/quarter if it does not exist</a:t>
-            </a:r>
-          </a:p>
-          <a:p>
-            <a:pPr marL="514350" indent="-514350">
-              <a:buFont typeface="+mj-lt"/>
-              <a:buAutoNum type="arabicPeriod"/>
-            </a:pPr>
-            <a:r>
-              <a:rPr lang="en-US" dirty="0"/>
-              <a:t>Generate code for ingestion of entire dataset into MYSQL database + join with existing dataset</a:t>
-            </a:r>
-          </a:p>
-          <a:p>
-            <a:pPr marL="514350" indent="-514350">
-              <a:buFont typeface="+mj-lt"/>
-              <a:buAutoNum type="arabicPeriod"/>
-            </a:pPr>
-            <a:r>
-              <a:rPr lang="en-US" dirty="0"/>
-              <a:t>Execute code created in #3</a:t>
-            </a:r>
-          </a:p>
-          <a:p>
-            <a:pPr marL="514350" indent="-514350">
-              <a:buFont typeface="+mj-lt"/>
-              <a:buAutoNum type="arabicPeriod"/>
-            </a:pPr>
-            <a:r>
-              <a:rPr lang="en-US" dirty="0"/>
-              <a:t>Generate code to create new MYSQL table with selected attributes for modeling</a:t>
-            </a:r>
-          </a:p>
-          <a:p>
-            <a:pPr marL="514350" indent="-514350">
-              <a:buFont typeface="+mj-lt"/>
-              <a:buAutoNum type="arabicPeriod"/>
-            </a:pPr>
-            <a:r>
-              <a:rPr lang="en-US" dirty="0"/>
-              <a:t>Execute code created in #5</a:t>
-            </a:r>
-          </a:p>
-          <a:p>
-            <a:pPr marL="514350" indent="-514350">
-              <a:buFont typeface="+mj-lt"/>
-              <a:buAutoNum type="arabicPeriod"/>
-            </a:pPr>
-            <a:r>
-              <a:rPr lang="en-US" dirty="0"/>
-              <a:t>Pull MYSQL modeling table into an R session, apply transformations</a:t>
-            </a:r>
-          </a:p>
-          <a:p>
-            <a:pPr marL="514350" indent="-514350">
-              <a:buFont typeface="+mj-lt"/>
-              <a:buAutoNum type="arabicPeriod"/>
-            </a:pPr>
-            <a:r>
-              <a:rPr lang="en-US" dirty="0"/>
-              <a:t>Build predictive models and save results</a:t>
-            </a:r>
-          </a:p>
-          <a:p>
-            <a:pPr marL="514350" indent="-514350">
-              <a:buFont typeface="+mj-lt"/>
-              <a:buAutoNum type="arabicPeriod"/>
-            </a:pPr>
-            <a:r>
-              <a:rPr lang="en-US" dirty="0"/>
-              <a:t>Create report of descriptive stats + modeling results</a:t>
-            </a:r>
-          </a:p>
-          <a:p>
-            <a:pPr marL="514350" indent="-514350">
-              <a:buFont typeface="+mj-lt"/>
-              <a:buAutoNum type="arabicPeriod"/>
-            </a:pPr>
-            <a:r>
-              <a:rPr lang="en-US" dirty="0"/>
-              <a:t>Email report</a:t>
-            </a:r>
-          </a:p>
-          <a:p>
-            <a:pPr marL="514350" indent="-514350">
-              <a:buFont typeface="+mj-lt"/>
-              <a:buAutoNum type="arabicPeriod"/>
-            </a:pPr>
-            <a:r>
-              <a:rPr lang="en-US" dirty="0"/>
-              <a:t>Check workflow code into </a:t>
-            </a:r>
-            <a:r>
-              <a:rPr lang="en-US" dirty="0" err="1"/>
-              <a:t>Github</a:t>
-            </a:r>
-            <a:r>
-              <a:rPr lang="en-US" dirty="0"/>
-              <a:t> repository</a:t>
-            </a:r>
-          </a:p>
-        </p:txBody>
-      </p:sp>
-    </p:spTree>
-    <p:extLst>
-      <p:ext uri="{BB962C8B-B14F-4D97-AF65-F5344CB8AC3E}">
-        <p14:creationId xmlns:p14="http://schemas.microsoft.com/office/powerpoint/2010/main" val="3361270873"/>
-      </p:ext>
-    </p:extLst>
-  </p:cSld>
-  <p:clrMapOvr>
-    <a:masterClrMapping/>
-  </p:clrMapOvr>
-</p:sld>
-</file>
-
 <file path=ppt/slides/slide14.xml><?xml version="1.0" encoding="utf-8"?>
 <p:sld xmlns:a="http://schemas.openxmlformats.org/drawingml/2006/main" xmlns:r="http://schemas.openxmlformats.org/officeDocument/2006/relationships" xmlns:p="http://schemas.openxmlformats.org/presentationml/2006/main">
   <p:cSld>
@@ -5452,6 +5395,222 @@
           <p:cNvPr id="2" name="Title 1">
             <a:extLst>
               <a:ext uri="{FF2B5EF4-FFF2-40B4-BE49-F238E27FC236}">
+                <a16:creationId xmlns:a16="http://schemas.microsoft.com/office/drawing/2014/main" id="{156B4F97-C8DC-884B-BE50-CAA56A351B04}"/>
+              </a:ext>
+            </a:extLst>
+          </p:cNvPr>
+          <p:cNvSpPr>
+            <a:spLocks noGrp="1"/>
+          </p:cNvSpPr>
+          <p:nvPr>
+            <p:ph type="title"/>
+          </p:nvPr>
+        </p:nvSpPr>
+        <p:spPr/>
+        <p:txBody>
+          <a:bodyPr/>
+          <a:lstStyle/>
+          <a:p>
+            <a:r>
+              <a:rPr lang="en-US" dirty="0"/>
+              <a:t>DEMO: Skeleton of </a:t>
+            </a:r>
+            <a:r>
+              <a:rPr lang="en-US" b="1" dirty="0" err="1">
+                <a:latin typeface="Courier New" panose="02070309020205020404" pitchFamily="49" charset="0"/>
+                <a:cs typeface="Courier New" panose="02070309020205020404" pitchFamily="49" charset="0"/>
+              </a:rPr>
+              <a:t>mysql_example.sh</a:t>
+            </a:r>
+            <a:endParaRPr lang="en-US" b="1" dirty="0">
+              <a:latin typeface="Courier New" panose="02070309020205020404" pitchFamily="49" charset="0"/>
+              <a:cs typeface="Courier New" panose="02070309020205020404" pitchFamily="49" charset="0"/>
+            </a:endParaRPr>
+          </a:p>
+        </p:txBody>
+      </p:sp>
+      <p:sp>
+        <p:nvSpPr>
+          <p:cNvPr id="3" name="Content Placeholder 2">
+            <a:extLst>
+              <a:ext uri="{FF2B5EF4-FFF2-40B4-BE49-F238E27FC236}">
+                <a16:creationId xmlns:a16="http://schemas.microsoft.com/office/drawing/2014/main" id="{BF5DC333-5F7D-074F-9393-5C73E060AA16}"/>
+              </a:ext>
+            </a:extLst>
+          </p:cNvPr>
+          <p:cNvSpPr>
+            <a:spLocks noGrp="1"/>
+          </p:cNvSpPr>
+          <p:nvPr>
+            <p:ph idx="1"/>
+          </p:nvPr>
+        </p:nvSpPr>
+        <p:spPr>
+          <a:xfrm>
+            <a:off x="838200" y="1449106"/>
+            <a:ext cx="10515600" cy="5252907"/>
+          </a:xfrm>
+        </p:spPr>
+        <p:txBody>
+          <a:bodyPr>
+            <a:normAutofit fontScale="85000" lnSpcReduction="20000"/>
+          </a:bodyPr>
+          <a:lstStyle/>
+          <a:p>
+            <a:pPr marL="514350" indent="-514350">
+              <a:buFont typeface="+mj-lt"/>
+              <a:buAutoNum type="arabicPeriod"/>
+            </a:pPr>
+            <a:r>
+              <a:rPr lang="en-US" dirty="0"/>
+              <a:t>Read in MYSQL credentials and set session parameters</a:t>
+            </a:r>
+          </a:p>
+          <a:p>
+            <a:pPr marL="514350" indent="-514350">
+              <a:buFont typeface="+mj-lt"/>
+              <a:buAutoNum type="arabicPeriod"/>
+            </a:pPr>
+            <a:r>
+              <a:rPr lang="en-US" dirty="0"/>
+              <a:t>Download dataset from Lending Club website for selected year/quarter if it does not exist</a:t>
+            </a:r>
+          </a:p>
+          <a:p>
+            <a:pPr marL="514350" indent="-514350">
+              <a:buFont typeface="+mj-lt"/>
+              <a:buAutoNum type="arabicPeriod"/>
+            </a:pPr>
+            <a:r>
+              <a:rPr lang="en-US" dirty="0"/>
+              <a:t>Generate code that moves data into MYSQL database + join with existing dataset</a:t>
+            </a:r>
+          </a:p>
+          <a:p>
+            <a:pPr marL="514350" indent="-514350">
+              <a:buFont typeface="+mj-lt"/>
+              <a:buAutoNum type="arabicPeriod"/>
+            </a:pPr>
+            <a:r>
+              <a:rPr lang="en-US" dirty="0"/>
+              <a:t>Execute code created in #3</a:t>
+            </a:r>
+          </a:p>
+          <a:p>
+            <a:pPr marL="514350" indent="-514350">
+              <a:buFont typeface="+mj-lt"/>
+              <a:buAutoNum type="arabicPeriod"/>
+            </a:pPr>
+            <a:r>
+              <a:rPr lang="en-US" dirty="0"/>
+              <a:t>Generate code to create new MYSQL table with selected attributes for modeling</a:t>
+            </a:r>
+          </a:p>
+          <a:p>
+            <a:pPr marL="514350" indent="-514350">
+              <a:buFont typeface="+mj-lt"/>
+              <a:buAutoNum type="arabicPeriod"/>
+            </a:pPr>
+            <a:r>
+              <a:rPr lang="en-US" dirty="0"/>
+              <a:t>Execute code created in #5</a:t>
+            </a:r>
+          </a:p>
+          <a:p>
+            <a:pPr marL="514350" indent="-514350">
+              <a:buFont typeface="+mj-lt"/>
+              <a:buAutoNum type="arabicPeriod"/>
+            </a:pPr>
+            <a:r>
+              <a:rPr lang="en-US" dirty="0"/>
+              <a:t>Pull MYSQL modeling table into an R session, apply transformations</a:t>
+            </a:r>
+          </a:p>
+          <a:p>
+            <a:pPr marL="514350" indent="-514350">
+              <a:buFont typeface="+mj-lt"/>
+              <a:buAutoNum type="arabicPeriod"/>
+            </a:pPr>
+            <a:r>
+              <a:rPr lang="en-US" dirty="0"/>
+              <a:t>Build predictive models and save results</a:t>
+            </a:r>
+          </a:p>
+          <a:p>
+            <a:pPr marL="514350" indent="-514350">
+              <a:buFont typeface="+mj-lt"/>
+              <a:buAutoNum type="arabicPeriod"/>
+            </a:pPr>
+            <a:r>
+              <a:rPr lang="en-US" dirty="0"/>
+              <a:t>Create report of descriptive stats + modeling results</a:t>
+            </a:r>
+          </a:p>
+          <a:p>
+            <a:pPr marL="514350" indent="-514350">
+              <a:buFont typeface="+mj-lt"/>
+              <a:buAutoNum type="arabicPeriod"/>
+            </a:pPr>
+            <a:r>
+              <a:rPr lang="en-US" dirty="0"/>
+              <a:t>Email report</a:t>
+            </a:r>
+          </a:p>
+          <a:p>
+            <a:pPr marL="514350" indent="-514350">
+              <a:buFont typeface="+mj-lt"/>
+              <a:buAutoNum type="arabicPeriod"/>
+            </a:pPr>
+            <a:r>
+              <a:rPr lang="en-US" dirty="0"/>
+              <a:t>Check workflow code into </a:t>
+            </a:r>
+            <a:r>
+              <a:rPr lang="en-US" dirty="0" err="1"/>
+              <a:t>Github</a:t>
+            </a:r>
+            <a:r>
+              <a:rPr lang="en-US" dirty="0"/>
+              <a:t> repository</a:t>
+            </a:r>
+          </a:p>
+        </p:txBody>
+      </p:sp>
+    </p:spTree>
+    <p:extLst>
+      <p:ext uri="{BB962C8B-B14F-4D97-AF65-F5344CB8AC3E}">
+        <p14:creationId xmlns:p14="http://schemas.microsoft.com/office/powerpoint/2010/main" val="3361270873"/>
+      </p:ext>
+    </p:extLst>
+  </p:cSld>
+  <p:clrMapOvr>
+    <a:masterClrMapping/>
+  </p:clrMapOvr>
+</p:sld>
+</file>
+
+<file path=ppt/slides/slide15.xml><?xml version="1.0" encoding="utf-8"?>
+<p:sld xmlns:a="http://schemas.openxmlformats.org/drawingml/2006/main" xmlns:r="http://schemas.openxmlformats.org/officeDocument/2006/relationships" xmlns:p="http://schemas.openxmlformats.org/presentationml/2006/main">
+  <p:cSld>
+    <p:spTree>
+      <p:nvGrpSpPr>
+        <p:cNvPr id="1" name=""/>
+        <p:cNvGrpSpPr/>
+        <p:nvPr/>
+      </p:nvGrpSpPr>
+      <p:grpSpPr>
+        <a:xfrm>
+          <a:off x="0" y="0"/>
+          <a:ext cx="0" cy="0"/>
+          <a:chOff x="0" y="0"/>
+          <a:chExt cx="0" cy="0"/>
+        </a:xfrm>
+      </p:grpSpPr>
+      <p:sp>
+        <p:nvSpPr>
+          <p:cNvPr id="2" name="Title 1">
+            <a:extLst>
+              <a:ext uri="{FF2B5EF4-FFF2-40B4-BE49-F238E27FC236}">
                 <a16:creationId xmlns:a16="http://schemas.microsoft.com/office/drawing/2014/main" id="{27D6ED08-6F70-5E44-B773-071A6B83BD0F}"/>
               </a:ext>
             </a:extLst>
@@ -5562,7 +5721,7 @@
 </p:sld>
 </file>
 
-<file path=ppt/slides/slide15.xml><?xml version="1.0" encoding="utf-8"?>
+<file path=ppt/slides/slide16.xml><?xml version="1.0" encoding="utf-8"?>
 <p:sld xmlns:a="http://schemas.openxmlformats.org/drawingml/2006/main" xmlns:r="http://schemas.openxmlformats.org/officeDocument/2006/relationships" xmlns:p="http://schemas.openxmlformats.org/presentationml/2006/main">
   <p:cSld>
     <p:spTree>
@@ -5975,20 +6134,6 @@
           <a:p>
             <a:r>
               <a:rPr lang="en-US" dirty="0"/>
-              <a:t>In an automated data science workflow, we link together a series of scripts that </a:t>
-            </a:r>
-            <a:r>
-              <a:rPr lang="en-US" i="1" dirty="0"/>
-              <a:t>could</a:t>
-            </a:r>
-            <a:r>
-              <a:rPr lang="en-US" dirty="0"/>
-              <a:t> be run without user intervention.</a:t>
-            </a:r>
-          </a:p>
-          <a:p>
-            <a:r>
-              <a:rPr lang="en-US" dirty="0"/>
               <a:t>An </a:t>
             </a:r>
             <a:r>
@@ -5997,7 +6142,7 @@
             </a:r>
             <a:r>
               <a:rPr lang="en-US" b="1" u="sng" dirty="0"/>
-              <a:t>-Bot</a:t>
+              <a:t>-bot</a:t>
             </a:r>
             <a:r>
               <a:rPr lang="en-US" dirty="0"/>
@@ -6039,14 +6184,18 @@
             </a:r>
           </a:p>
           <a:p>
-            <a:pPr lvl="1"/>
-            <a:endParaRPr lang="en-US" dirty="0"/>
-          </a:p>
-          <a:p>
-            <a:endParaRPr lang="en-US" dirty="0"/>
-          </a:p>
-          <a:p>
-            <a:endParaRPr lang="en-US" dirty="0"/>
+            <a:r>
+              <a:rPr lang="en-US" dirty="0"/>
+              <a:t>An end-to-end automated data science workflow could consist of a collection of </a:t>
+            </a:r>
+            <a:r>
+              <a:rPr lang="en-US" b="1" i="1" dirty="0"/>
+              <a:t>R-bots</a:t>
+            </a:r>
+            <a:r>
+              <a:rPr lang="en-US" dirty="0"/>
+              <a:t> executed from a common framework.</a:t>
+            </a:r>
           </a:p>
           <a:p>
             <a:endParaRPr lang="en-US" dirty="0"/>
@@ -6382,7 +6531,15 @@
             <a:pPr lvl="0"/>
             <a:r>
               <a:rPr lang="en-US" dirty="0"/>
-              <a:t>Use common framework from which all scripts are executed (e.g., R, Bash)</a:t>
+              <a:t>Use common framework from which all </a:t>
+            </a:r>
+            <a:r>
+              <a:rPr lang="en-US" b="1" i="1" dirty="0"/>
+              <a:t>R-bots</a:t>
+            </a:r>
+            <a:r>
+              <a:rPr lang="en-US" dirty="0"/>
+              <a:t> are executed (e.g., R, Bash)</a:t>
             </a:r>
           </a:p>
           <a:p>
@@ -6489,6 +6646,165 @@
           <a:p>
             <a:r>
               <a:rPr lang="en-US" dirty="0"/>
+              <a:t>R packages for workflow management</a:t>
+            </a:r>
+          </a:p>
+        </p:txBody>
+      </p:sp>
+      <p:sp>
+        <p:nvSpPr>
+          <p:cNvPr id="4" name="Content Placeholder 3">
+            <a:extLst>
+              <a:ext uri="{FF2B5EF4-FFF2-40B4-BE49-F238E27FC236}">
+                <a16:creationId xmlns:a16="http://schemas.microsoft.com/office/drawing/2014/main" id="{CD7D28C0-C85F-3242-BDDD-7ECC05172DBF}"/>
+              </a:ext>
+            </a:extLst>
+          </p:cNvPr>
+          <p:cNvSpPr>
+            <a:spLocks noGrp="1"/>
+          </p:cNvSpPr>
+          <p:nvPr>
+            <p:ph idx="1"/>
+          </p:nvPr>
+        </p:nvSpPr>
+        <p:spPr>
+          <a:xfrm>
+            <a:off x="838199" y="1690690"/>
+            <a:ext cx="3490609" cy="4070229"/>
+          </a:xfrm>
+        </p:spPr>
+        <p:txBody>
+          <a:bodyPr/>
+          <a:lstStyle/>
+          <a:p>
+            <a:pPr lvl="1"/>
+            <a:r>
+              <a:rPr lang="en-US" dirty="0">
+                <a:latin typeface="Courier New" panose="02070309020205020404" pitchFamily="49" charset="0"/>
+                <a:ea typeface="Calibri" panose="020F0502020204030204" pitchFamily="34" charset="0"/>
+                <a:cs typeface="Courier New" panose="02070309020205020404" pitchFamily="49" charset="0"/>
+                <a:hlinkClick r:id="rId2"/>
+              </a:rPr>
+              <a:t>workflowr</a:t>
+            </a:r>
+            <a:endParaRPr lang="en-US" dirty="0">
+              <a:latin typeface="Courier New" panose="02070309020205020404" pitchFamily="49" charset="0"/>
+              <a:ea typeface="Calibri" panose="020F0502020204030204" pitchFamily="34" charset="0"/>
+              <a:cs typeface="Courier New" panose="02070309020205020404" pitchFamily="49" charset="0"/>
+            </a:endParaRPr>
+          </a:p>
+          <a:p>
+            <a:pPr lvl="1"/>
+            <a:r>
+              <a:rPr lang="en-US" dirty="0">
+                <a:latin typeface="Courier New" panose="02070309020205020404" pitchFamily="49" charset="0"/>
+                <a:ea typeface="Calibri" panose="020F0502020204030204" pitchFamily="34" charset="0"/>
+                <a:cs typeface="Courier New" panose="02070309020205020404" pitchFamily="49" charset="0"/>
+                <a:hlinkClick r:id="rId3"/>
+              </a:rPr>
+              <a:t>drake</a:t>
+            </a:r>
+            <a:endParaRPr lang="en-US" dirty="0">
+              <a:latin typeface="Courier New" panose="02070309020205020404" pitchFamily="49" charset="0"/>
+              <a:ea typeface="Calibri" panose="020F0502020204030204" pitchFamily="34" charset="0"/>
+              <a:cs typeface="Courier New" panose="02070309020205020404" pitchFamily="49" charset="0"/>
+            </a:endParaRPr>
+          </a:p>
+          <a:p>
+            <a:pPr marL="0" indent="0">
+              <a:buNone/>
+            </a:pPr>
+            <a:endParaRPr lang="en-US" dirty="0">
+              <a:latin typeface="Courier New" panose="02070309020205020404" pitchFamily="49" charset="0"/>
+              <a:ea typeface="Calibri" panose="020F0502020204030204" pitchFamily="34" charset="0"/>
+              <a:cs typeface="Courier New" panose="02070309020205020404" pitchFamily="49" charset="0"/>
+            </a:endParaRPr>
+          </a:p>
+        </p:txBody>
+      </p:sp>
+      <p:pic>
+        <p:nvPicPr>
+          <p:cNvPr id="7" name="Picture 6">
+            <a:extLst>
+              <a:ext uri="{FF2B5EF4-FFF2-40B4-BE49-F238E27FC236}">
+                <a16:creationId xmlns:a16="http://schemas.microsoft.com/office/drawing/2014/main" id="{4355C578-9070-134A-9734-E600D5F5670E}"/>
+              </a:ext>
+            </a:extLst>
+          </p:cNvPr>
+          <p:cNvPicPr>
+            <a:picLocks noChangeAspect="1"/>
+          </p:cNvPicPr>
+          <p:nvPr/>
+        </p:nvPicPr>
+        <p:blipFill>
+          <a:blip r:embed="rId4"/>
+          <a:stretch>
+            <a:fillRect/>
+          </a:stretch>
+        </p:blipFill>
+        <p:spPr>
+          <a:xfrm>
+            <a:off x="4432841" y="1399667"/>
+            <a:ext cx="7632700" cy="5346700"/>
+          </a:xfrm>
+          <a:prstGeom prst="rect">
+            <a:avLst/>
+          </a:prstGeom>
+        </p:spPr>
+      </p:pic>
+    </p:spTree>
+    <p:extLst>
+      <p:ext uri="{BB962C8B-B14F-4D97-AF65-F5344CB8AC3E}">
+        <p14:creationId xmlns:p14="http://schemas.microsoft.com/office/powerpoint/2010/main" val="1034752107"/>
+      </p:ext>
+    </p:extLst>
+  </p:cSld>
+  <p:clrMapOvr>
+    <a:masterClrMapping/>
+  </p:clrMapOvr>
+</p:sld>
+</file>
+
+<file path=ppt/slides/slide9.xml><?xml version="1.0" encoding="utf-8"?>
+<p:sld xmlns:a="http://schemas.openxmlformats.org/drawingml/2006/main" xmlns:r="http://schemas.openxmlformats.org/officeDocument/2006/relationships" xmlns:p="http://schemas.openxmlformats.org/presentationml/2006/main">
+  <p:cSld>
+    <p:spTree>
+      <p:nvGrpSpPr>
+        <p:cNvPr id="1" name=""/>
+        <p:cNvGrpSpPr/>
+        <p:nvPr/>
+      </p:nvGrpSpPr>
+      <p:grpSpPr>
+        <a:xfrm>
+          <a:off x="0" y="0"/>
+          <a:ext cx="0" cy="0"/>
+          <a:chOff x="0" y="0"/>
+          <a:chExt cx="0" cy="0"/>
+        </a:xfrm>
+      </p:grpSpPr>
+      <p:sp>
+        <p:nvSpPr>
+          <p:cNvPr id="2" name="Title 1">
+            <a:extLst>
+              <a:ext uri="{FF2B5EF4-FFF2-40B4-BE49-F238E27FC236}">
+                <a16:creationId xmlns:a16="http://schemas.microsoft.com/office/drawing/2014/main" id="{7E6F8741-54FD-D743-972A-3A7CB54562DE}"/>
+              </a:ext>
+            </a:extLst>
+          </p:cNvPr>
+          <p:cNvSpPr>
+            <a:spLocks noGrp="1"/>
+          </p:cNvSpPr>
+          <p:nvPr>
+            <p:ph type="title"/>
+          </p:nvPr>
+        </p:nvSpPr>
+        <p:spPr/>
+        <p:txBody>
+          <a:bodyPr/>
+          <a:lstStyle/>
+          <a:p>
+            <a:r>
+              <a:rPr lang="en-US" dirty="0"/>
               <a:t>Tools/Utilities</a:t>
             </a:r>
           </a:p>
@@ -6510,14 +6826,14 @@
             <p:ph idx="1"/>
             <p:extLst>
               <p:ext uri="{D42A27DB-BD31-4B8C-83A1-F6EECF244321}">
-                <p14:modId xmlns:p14="http://schemas.microsoft.com/office/powerpoint/2010/main" val="3521439038"/>
+                <p14:modId xmlns:p14="http://schemas.microsoft.com/office/powerpoint/2010/main" val="3374968660"/>
               </p:ext>
             </p:extLst>
           </p:nvPr>
         </p:nvGraphicFramePr>
         <p:xfrm>
           <a:off x="838200" y="1392223"/>
-          <a:ext cx="10515600" cy="4573095"/>
+          <a:ext cx="10515600" cy="3492936"/>
         </p:xfrm>
         <a:graphic>
           <a:graphicData uri="http://schemas.openxmlformats.org/drawingml/2006/table">
@@ -6546,7 +6862,7 @@
                   </a:extLst>
                 </a:gridCol>
               </a:tblGrid>
-              <a:tr h="270411">
+              <a:tr h="238665">
                 <a:tc>
                   <a:txBody>
                     <a:bodyPr/>
@@ -6720,7 +7036,7 @@
                           <a:ea typeface="Calibri" panose="020F0502020204030204" pitchFamily="34" charset="0"/>
                           <a:cs typeface="Times New Roman" panose="02020603050405020304" pitchFamily="18" charset="0"/>
                         </a:rPr>
-                        <a:t>Bash functions</a:t>
+                        <a:t>Bash Functions</a:t>
                       </a:r>
                       <a:endParaRPr lang="en-US" sz="1800" dirty="0">
                         <a:effectLst/>
@@ -6778,7 +7094,7 @@
                   </a:ext>
                 </a:extLst>
               </a:tr>
-              <a:tr h="802111">
+              <a:tr h="524232">
                 <a:tc>
                   <a:txBody>
                     <a:bodyPr/>
@@ -6793,7 +7109,7 @@
                         </a:spcAft>
                       </a:pPr>
                       <a:r>
-                        <a:rPr lang="en-US" sz="1800">
+                        <a:rPr lang="en-US" sz="1800" dirty="0">
                           <a:effectLst/>
                           <a:latin typeface="Calibri" panose="020F0502020204030204" pitchFamily="34" charset="0"/>
                           <a:ea typeface="Calibri" panose="020F0502020204030204" pitchFamily="34" charset="0"/>
@@ -6856,16 +7172,17 @@
                         </a:spcAft>
                       </a:pPr>
                       <a:r>
-                        <a:rPr lang="en-US" sz="1800">
+                        <a:rPr lang="en-US" sz="1800" dirty="0">
                           <a:effectLst/>
                           <a:latin typeface="Courier New" panose="02070309020205020404" pitchFamily="49" charset="0"/>
                           <a:ea typeface="Calibri" panose="020F0502020204030204" pitchFamily="34" charset="0"/>
                           <a:cs typeface="Times New Roman" panose="02020603050405020304" pitchFamily="18" charset="0"/>
+                          <a:hlinkClick r:id="rId2"/>
                         </a:rPr>
                         <a:t>RJDBC</a:t>
                       </a:r>
                       <a:r>
-                        <a:rPr lang="en-US" sz="1800">
+                        <a:rPr lang="en-US" sz="1800" dirty="0">
                           <a:effectLst/>
                           <a:latin typeface="Calibri" panose="020F0502020204030204" pitchFamily="34" charset="0"/>
                           <a:ea typeface="Calibri" panose="020F0502020204030204" pitchFamily="34" charset="0"/>
@@ -6874,15 +7191,35 @@
                         <a:t>, </a:t>
                       </a:r>
                       <a:r>
-                        <a:rPr lang="en-US" sz="1800">
+                        <a:rPr lang="en-US" sz="1800" dirty="0">
+                          <a:effectLst/>
+                          <a:latin typeface="Courier New" panose="02070309020205020404" pitchFamily="49" charset="0"/>
+                          <a:ea typeface="Calibri" panose="020F0502020204030204" pitchFamily="34" charset="0"/>
+                          <a:cs typeface="Times New Roman" panose="02020603050405020304" pitchFamily="18" charset="0"/>
+                          <a:hlinkClick r:id="rId3"/>
+                        </a:rPr>
+                        <a:t>odbc</a:t>
+                      </a:r>
+                      <a:r>
+                        <a:rPr lang="en-US" sz="1800" dirty="0">
                           <a:effectLst/>
                           <a:latin typeface="Courier New" panose="02070309020205020404" pitchFamily="49" charset="0"/>
                           <a:ea typeface="Calibri" panose="020F0502020204030204" pitchFamily="34" charset="0"/>
                           <a:cs typeface="Times New Roman" panose="02020603050405020304" pitchFamily="18" charset="0"/>
                         </a:rPr>
-                        <a:t>ODBC</a:t>
+                        <a:t>,</a:t>
                       </a:r>
-                      <a:endParaRPr lang="en-US" sz="1800">
+                      <a:r>
+                        <a:rPr lang="en-US" sz="1800" dirty="0">
+                          <a:effectLst/>
+                          <a:latin typeface="Courier New" panose="02070309020205020404" pitchFamily="49" charset="0"/>
+                          <a:ea typeface="Calibri" panose="020F0502020204030204" pitchFamily="34" charset="0"/>
+                          <a:cs typeface="Times New Roman" panose="02020603050405020304" pitchFamily="18" charset="0"/>
+                          <a:hlinkClick r:id="rId4"/>
+                        </a:rPr>
+                        <a:t>RMySQL</a:t>
+                      </a:r>
+                      <a:endParaRPr lang="en-US" sz="1800" dirty="0">
                         <a:effectLst/>
                         <a:latin typeface="Calibri" panose="020F0502020204030204" pitchFamily="34" charset="0"/>
                         <a:ea typeface="Calibri" panose="020F0502020204030204" pitchFamily="34" charset="0"/>
@@ -6998,7 +7335,7 @@
                   </a:ext>
                 </a:extLst>
               </a:tr>
-              <a:tr h="534741">
+              <a:tr h="524232">
                 <a:tc>
                   <a:txBody>
                     <a:bodyPr/>
@@ -7013,7 +7350,7 @@
                         </a:spcAft>
                       </a:pPr>
                       <a:r>
-                        <a:rPr lang="en-US" sz="1800">
+                        <a:rPr lang="en-US" sz="1800" dirty="0">
                           <a:effectLst/>
                           <a:latin typeface="Calibri" panose="020F0502020204030204" pitchFamily="34" charset="0"/>
                           <a:ea typeface="Calibri" panose="020F0502020204030204" pitchFamily="34" charset="0"/>
@@ -7081,9 +7418,16 @@
                           <a:latin typeface="Courier New" panose="02070309020205020404" pitchFamily="49" charset="0"/>
                           <a:ea typeface="Calibri" panose="020F0502020204030204" pitchFamily="34" charset="0"/>
                           <a:cs typeface="Courier New" panose="02070309020205020404" pitchFamily="49" charset="0"/>
+                          <a:hlinkClick r:id="rId5"/>
                         </a:rPr>
                         <a:t>krb5</a:t>
                       </a:r>
+                      <a:endParaRPr lang="en-US" sz="1800" dirty="0">
+                        <a:effectLst/>
+                        <a:latin typeface="Courier New" panose="02070309020205020404" pitchFamily="49" charset="0"/>
+                        <a:ea typeface="Calibri" panose="020F0502020204030204" pitchFamily="34" charset="0"/>
+                        <a:cs typeface="Courier New" panose="02070309020205020404" pitchFamily="49" charset="0"/>
+                      </a:endParaRPr>
                     </a:p>
                   </a:txBody>
                   <a:tcPr marL="68580" marR="68580" marT="0" marB="0" anchor="ctr">
@@ -7139,7 +7483,7 @@
                         </a:spcAft>
                       </a:pPr>
                       <a:r>
-                        <a:rPr lang="en-US" sz="1800">
+                        <a:rPr lang="en-US" sz="1800" dirty="0">
                           <a:effectLst/>
                           <a:latin typeface="Courier New" panose="02070309020205020404" pitchFamily="49" charset="0"/>
                           <a:ea typeface="Calibri" panose="020F0502020204030204" pitchFamily="34" charset="0"/>
@@ -7147,15 +7491,12 @@
                         </a:rPr>
                         <a:t>kinit</a:t>
                       </a:r>
-                      <a:r>
-                        <a:rPr lang="en-US" sz="1800">
-                          <a:effectLst/>
-                          <a:latin typeface="Calibri" panose="020F0502020204030204" pitchFamily="34" charset="0"/>
-                          <a:ea typeface="Calibri" panose="020F0502020204030204" pitchFamily="34" charset="0"/>
-                          <a:cs typeface="Times New Roman" panose="02020603050405020304" pitchFamily="18" charset="0"/>
-                        </a:rPr>
-                        <a:t> using keytab credentials file</a:t>
-                      </a:r>
+                      <a:endParaRPr lang="en-US" sz="1800" dirty="0">
+                        <a:effectLst/>
+                        <a:latin typeface="Calibri" panose="020F0502020204030204" pitchFamily="34" charset="0"/>
+                        <a:ea typeface="Calibri" panose="020F0502020204030204" pitchFamily="34" charset="0"/>
+                        <a:cs typeface="Times New Roman" panose="02020603050405020304" pitchFamily="18" charset="0"/>
+                      </a:endParaRPr>
                     </a:p>
                   </a:txBody>
                   <a:tcPr marL="68580" marR="68580" marT="0" marB="0" anchor="ctr">
@@ -7203,7 +7544,7 @@
                   </a:ext>
                 </a:extLst>
               </a:tr>
-              <a:tr h="270411">
+              <a:tr h="524232">
                 <a:tc>
                   <a:txBody>
                     <a:bodyPr/>
@@ -7218,7 +7559,7 @@
                         </a:spcAft>
                       </a:pPr>
                       <a:r>
-                        <a:rPr lang="en-US" sz="1800">
+                        <a:rPr lang="en-US" sz="1800" dirty="0">
                           <a:effectLst/>
                           <a:latin typeface="Calibri" panose="020F0502020204030204" pitchFamily="34" charset="0"/>
                           <a:ea typeface="Calibri" panose="020F0502020204030204" pitchFamily="34" charset="0"/>
@@ -7281,15 +7622,16 @@
                         </a:spcAft>
                       </a:pPr>
                       <a:r>
-                        <a:rPr lang="en-US" sz="1800">
+                        <a:rPr lang="en-US" sz="1800" dirty="0">
                           <a:effectLst/>
                           <a:latin typeface="Courier New" panose="02070309020205020404" pitchFamily="49" charset="0"/>
                           <a:ea typeface="Calibri" panose="020F0502020204030204" pitchFamily="34" charset="0"/>
                           <a:cs typeface="Times New Roman" panose="02020603050405020304" pitchFamily="18" charset="0"/>
+                          <a:hlinkClick r:id="rId6"/>
                         </a:rPr>
                         <a:t>XLConnect</a:t>
                       </a:r>
-                      <a:endParaRPr lang="en-US" sz="1800">
+                      <a:endParaRPr lang="en-US" sz="1800" dirty="0">
                         <a:effectLst/>
                         <a:latin typeface="Calibri" panose="020F0502020204030204" pitchFamily="34" charset="0"/>
                         <a:ea typeface="Calibri" panose="020F0502020204030204" pitchFamily="34" charset="0"/>
@@ -7405,7 +7747,7 @@
                   </a:ext>
                 </a:extLst>
               </a:tr>
-              <a:tr h="534741">
+              <a:tr h="524232">
                 <a:tc>
                   <a:txBody>
                     <a:bodyPr/>
@@ -7420,7 +7762,7 @@
                         </a:spcAft>
                       </a:pPr>
                       <a:r>
-                        <a:rPr lang="en-US" sz="1800">
+                        <a:rPr lang="en-US" sz="1800" dirty="0">
                           <a:effectLst/>
                           <a:latin typeface="Calibri" panose="020F0502020204030204" pitchFamily="34" charset="0"/>
                           <a:ea typeface="Calibri" panose="020F0502020204030204" pitchFamily="34" charset="0"/>
@@ -7483,16 +7825,17 @@
                         </a:spcAft>
                       </a:pPr>
                       <a:r>
-                        <a:rPr lang="en-US" sz="1800">
+                        <a:rPr lang="en-US" sz="1800" dirty="0">
                           <a:effectLst/>
                           <a:latin typeface="Courier New" panose="02070309020205020404" pitchFamily="49" charset="0"/>
                           <a:ea typeface="Calibri" panose="020F0502020204030204" pitchFamily="34" charset="0"/>
                           <a:cs typeface="Times New Roman" panose="02020603050405020304" pitchFamily="18" charset="0"/>
+                          <a:hlinkClick r:id="rId7"/>
                         </a:rPr>
                         <a:t>rmarkdown</a:t>
                       </a:r>
                       <a:r>
-                        <a:rPr lang="en-US" sz="1800">
+                        <a:rPr lang="en-US" sz="1800" dirty="0">
                           <a:effectLst/>
                           <a:latin typeface="Calibri" panose="020F0502020204030204" pitchFamily="34" charset="0"/>
                           <a:ea typeface="Calibri" panose="020F0502020204030204" pitchFamily="34" charset="0"/>
@@ -7501,15 +7844,16 @@
                         <a:t>, </a:t>
                       </a:r>
                       <a:r>
-                        <a:rPr lang="en-US" sz="1800">
+                        <a:rPr lang="en-US" sz="1800" dirty="0">
                           <a:effectLst/>
                           <a:latin typeface="Courier New" panose="02070309020205020404" pitchFamily="49" charset="0"/>
                           <a:ea typeface="Calibri" panose="020F0502020204030204" pitchFamily="34" charset="0"/>
                           <a:cs typeface="Times New Roman" panose="02020603050405020304" pitchFamily="18" charset="0"/>
+                          <a:hlinkClick r:id="rId8"/>
                         </a:rPr>
                         <a:t>knitr</a:t>
                       </a:r>
-                      <a:endParaRPr lang="en-US" sz="1800">
+                      <a:endParaRPr lang="en-US" sz="1800" dirty="0">
                         <a:effectLst/>
                         <a:latin typeface="Calibri" panose="020F0502020204030204" pitchFamily="34" charset="0"/>
                         <a:ea typeface="Calibri" panose="020F0502020204030204" pitchFamily="34" charset="0"/>
@@ -7625,7 +7969,7 @@
                   </a:ext>
                 </a:extLst>
               </a:tr>
-              <a:tr h="1604222">
+              <a:tr h="524232">
                 <a:tc>
                   <a:txBody>
                     <a:bodyPr/>
@@ -7703,16 +8047,26 @@
                         </a:spcAft>
                       </a:pPr>
                       <a:r>
-                        <a:rPr lang="en-US" sz="1800">
+                        <a:rPr lang="en-US" sz="1800" dirty="0">
+                          <a:effectLst/>
+                          <a:latin typeface="Courier New" panose="02070309020205020404" pitchFamily="49" charset="0"/>
+                          <a:ea typeface="Calibri" panose="020F0502020204030204" pitchFamily="34" charset="0"/>
+                          <a:cs typeface="Times New Roman" panose="02020603050405020304" pitchFamily="18" charset="0"/>
+                          <a:hlinkClick r:id="rId9"/>
+                        </a:rPr>
+                        <a:t>mailR</a:t>
+                      </a:r>
+                      <a:r>
+                        <a:rPr lang="en-US" sz="1800" baseline="30000" dirty="0">
                           <a:effectLst/>
                           <a:latin typeface="Courier New" panose="02070309020205020404" pitchFamily="49" charset="0"/>
                           <a:ea typeface="Calibri" panose="020F0502020204030204" pitchFamily="34" charset="0"/>
                           <a:cs typeface="Times New Roman" panose="02020603050405020304" pitchFamily="18" charset="0"/>
                         </a:rPr>
-                        <a:t>mailR</a:t>
+                        <a:t>*</a:t>
                       </a:r>
                       <a:r>
-                        <a:rPr lang="en-US" sz="1800">
+                        <a:rPr lang="en-US" sz="1800" dirty="0">
                           <a:effectLst/>
                           <a:latin typeface="Calibri" panose="020F0502020204030204" pitchFamily="34" charset="0"/>
                           <a:ea typeface="Calibri" panose="020F0502020204030204" pitchFamily="34" charset="0"/>
@@ -7721,58 +8075,58 @@
                         <a:t>, </a:t>
                       </a:r>
                       <a:r>
-                        <a:rPr lang="en-US" sz="1800">
+                        <a:rPr lang="en-US" sz="1800" dirty="0">
+                          <a:effectLst/>
+                          <a:latin typeface="Courier New" panose="02070309020205020404" pitchFamily="49" charset="0"/>
+                          <a:ea typeface="Calibri" panose="020F0502020204030204" pitchFamily="34" charset="0"/>
+                          <a:cs typeface="Times New Roman" panose="02020603050405020304" pitchFamily="18" charset="0"/>
+                          <a:hlinkClick r:id="rId10"/>
+                        </a:rPr>
+                        <a:t>sendmailR</a:t>
+                      </a:r>
+                      <a:r>
+                        <a:rPr lang="en-US" sz="1800" baseline="30000" dirty="0">
                           <a:effectLst/>
                           <a:latin typeface="Courier New" panose="02070309020205020404" pitchFamily="49" charset="0"/>
                           <a:ea typeface="Calibri" panose="020F0502020204030204" pitchFamily="34" charset="0"/>
                           <a:cs typeface="Times New Roman" panose="02020603050405020304" pitchFamily="18" charset="0"/>
                         </a:rPr>
-                        <a:t>sendmailR</a:t>
+                        <a:t>*</a:t>
                       </a:r>
-                      <a:endParaRPr lang="en-US" sz="1800">
+                      <a:r>
+                        <a:rPr lang="en-US" sz="1800" dirty="0">
+                          <a:effectLst/>
+                          <a:latin typeface="Courier New" panose="02070309020205020404" pitchFamily="49" charset="0"/>
+                          <a:ea typeface="Calibri" panose="020F0502020204030204" pitchFamily="34" charset="0"/>
+                          <a:cs typeface="Times New Roman" panose="02020603050405020304" pitchFamily="18" charset="0"/>
+                        </a:rPr>
+                        <a:t>, </a:t>
+                      </a:r>
+                      <a:r>
+                        <a:rPr lang="en-US" sz="1800" dirty="0">
+                          <a:effectLst/>
+                          <a:latin typeface="Courier New" panose="02070309020205020404" pitchFamily="49" charset="0"/>
+                          <a:ea typeface="Calibri" panose="020F0502020204030204" pitchFamily="34" charset="0"/>
+                          <a:cs typeface="Times New Roman" panose="02020603050405020304" pitchFamily="18" charset="0"/>
+                          <a:hlinkClick r:id="rId11"/>
+                        </a:rPr>
+                        <a:t>gmailr</a:t>
+                      </a:r>
+                      <a:r>
+                        <a:rPr lang="en-US" sz="1800" baseline="30000" dirty="0">
+                          <a:effectLst/>
+                          <a:latin typeface="Courier New" panose="02070309020205020404" pitchFamily="49" charset="0"/>
+                          <a:ea typeface="Calibri" panose="020F0502020204030204" pitchFamily="34" charset="0"/>
+                          <a:cs typeface="Times New Roman" panose="02020603050405020304" pitchFamily="18" charset="0"/>
+                        </a:rPr>
+                        <a:t>+</a:t>
+                      </a:r>
+                      <a:endParaRPr lang="en-US" sz="1800" dirty="0">
                         <a:effectLst/>
                         <a:latin typeface="Calibri" panose="020F0502020204030204" pitchFamily="34" charset="0"/>
                         <a:ea typeface="Calibri" panose="020F0502020204030204" pitchFamily="34" charset="0"/>
                         <a:cs typeface="Times New Roman" panose="02020603050405020304" pitchFamily="18" charset="0"/>
                       </a:endParaRPr>
-                    </a:p>
-                    <a:p>
-                      <a:pPr marL="0" marR="0">
-                        <a:spcBef>
-                          <a:spcPts val="0"/>
-                        </a:spcBef>
-                        <a:spcAft>
-                          <a:spcPts val="0"/>
-                        </a:spcAft>
-                      </a:pPr>
-                      <a:r>
-                        <a:rPr lang="en-US" sz="1800">
-                          <a:effectLst/>
-                          <a:latin typeface="Calibri" panose="020F0502020204030204" pitchFamily="34" charset="0"/>
-                          <a:ea typeface="Calibri" panose="020F0502020204030204" pitchFamily="34" charset="0"/>
-                          <a:cs typeface="Times New Roman" panose="02020603050405020304" pitchFamily="18" charset="0"/>
-                        </a:rPr>
-                        <a:t> </a:t>
-                      </a:r>
-                    </a:p>
-                    <a:p>
-                      <a:pPr marL="0" marR="0">
-                        <a:spcBef>
-                          <a:spcPts val="0"/>
-                        </a:spcBef>
-                        <a:spcAft>
-                          <a:spcPts val="0"/>
-                        </a:spcAft>
-                      </a:pPr>
-                      <a:r>
-                        <a:rPr lang="en-US" sz="1800">
-                          <a:effectLst/>
-                          <a:latin typeface="Calibri" panose="020F0502020204030204" pitchFamily="34" charset="0"/>
-                          <a:ea typeface="Calibri" panose="020F0502020204030204" pitchFamily="34" charset="0"/>
-                          <a:cs typeface="Times New Roman" panose="02020603050405020304" pitchFamily="18" charset="0"/>
-                        </a:rPr>
-                        <a:t>** These don’t always work behind firewalls with restricted network settings.</a:t>
-                      </a:r>
                     </a:p>
                   </a:txBody>
                   <a:tcPr marL="68580" marR="68580" marT="0" marB="0" anchor="ctr">
@@ -7828,15 +8182,15 @@
                         </a:spcAft>
                       </a:pPr>
                       <a:r>
-                        <a:rPr lang="en-US" sz="1800">
+                        <a:rPr lang="en-US" sz="1800" dirty="0">
                           <a:effectLst/>
                           <a:latin typeface="Courier New" panose="02070309020205020404" pitchFamily="49" charset="0"/>
                           <a:ea typeface="Calibri" panose="020F0502020204030204" pitchFamily="34" charset="0"/>
                           <a:cs typeface="Times New Roman" panose="02020603050405020304" pitchFamily="18" charset="0"/>
                         </a:rPr>
-                        <a:t>mailx</a:t>
+                        <a:t>mail/mailx</a:t>
                       </a:r>
-                      <a:endParaRPr lang="en-US" sz="1800">
+                      <a:endParaRPr lang="en-US" sz="1800" dirty="0">
                         <a:effectLst/>
                         <a:latin typeface="Calibri" panose="020F0502020204030204" pitchFamily="34" charset="0"/>
                         <a:ea typeface="Calibri" panose="020F0502020204030204" pitchFamily="34" charset="0"/>
@@ -7889,7 +8243,7 @@
                   </a:ext>
                 </a:extLst>
               </a:tr>
-              <a:tr h="534741">
+              <a:tr h="524232">
                 <a:tc>
                   <a:txBody>
                     <a:bodyPr/>
@@ -7967,15 +8321,16 @@
                         </a:spcAft>
                       </a:pPr>
                       <a:r>
-                        <a:rPr lang="en-US" sz="1800">
+                        <a:rPr lang="en-US" sz="1800" dirty="0">
                           <a:effectLst/>
                           <a:latin typeface="Courier New" panose="02070309020205020404" pitchFamily="49" charset="0"/>
                           <a:ea typeface="Calibri" panose="020F0502020204030204" pitchFamily="34" charset="0"/>
                           <a:cs typeface="Times New Roman" panose="02020603050405020304" pitchFamily="18" charset="0"/>
+                          <a:hlinkClick r:id="rId12"/>
                         </a:rPr>
                         <a:t>cronR</a:t>
                       </a:r>
-                      <a:endParaRPr lang="en-US" sz="1800">
+                      <a:endParaRPr lang="en-US" sz="1800" dirty="0">
                         <a:effectLst/>
                         <a:latin typeface="Calibri" panose="020F0502020204030204" pitchFamily="34" charset="0"/>
                         <a:ea typeface="Calibri" panose="020F0502020204030204" pitchFamily="34" charset="0"/>
@@ -8101,108 +8456,65 @@
           </a:graphicData>
         </a:graphic>
       </p:graphicFrame>
+      <p:sp>
+        <p:nvSpPr>
+          <p:cNvPr id="3" name="Rectangle 2">
+            <a:extLst>
+              <a:ext uri="{FF2B5EF4-FFF2-40B4-BE49-F238E27FC236}">
+                <a16:creationId xmlns:a16="http://schemas.microsoft.com/office/drawing/2014/main" id="{96A685D5-9B8D-234F-82A0-E1C6AF03B503}"/>
+              </a:ext>
+            </a:extLst>
+          </p:cNvPr>
+          <p:cNvSpPr/>
+          <p:nvPr/>
+        </p:nvSpPr>
+        <p:spPr>
+          <a:xfrm>
+            <a:off x="838200" y="5058883"/>
+            <a:ext cx="10515600" cy="1015663"/>
+          </a:xfrm>
+          <a:prstGeom prst="rect">
+            <a:avLst/>
+          </a:prstGeom>
+        </p:spPr>
+        <p:txBody>
+          <a:bodyPr wrap="square">
+            <a:spAutoFit/>
+          </a:bodyPr>
+          <a:lstStyle/>
+          <a:p>
+            <a:r>
+              <a:rPr lang="en-US" sz="1600" dirty="0">
+                <a:latin typeface="Calibri" panose="020F0502020204030204" pitchFamily="34" charset="0"/>
+                <a:ea typeface="Calibri" panose="020F0502020204030204" pitchFamily="34" charset="0"/>
+                <a:cs typeface="Times New Roman" panose="02020603050405020304" pitchFamily="18" charset="0"/>
+              </a:rPr>
+              <a:t>* More advanced configuration may be necessary in order to get these working behind firewalls with restricted network settings.</a:t>
+            </a:r>
+          </a:p>
+          <a:p>
+            <a:endParaRPr lang="en-US" sz="1000" dirty="0">
+              <a:latin typeface="Calibri" panose="020F0502020204030204" pitchFamily="34" charset="0"/>
+              <a:ea typeface="Calibri" panose="020F0502020204030204" pitchFamily="34" charset="0"/>
+              <a:cs typeface="Times New Roman" panose="02020603050405020304" pitchFamily="18" charset="0"/>
+            </a:endParaRPr>
+          </a:p>
+          <a:p>
+            <a:r>
+              <a:rPr lang="en-US" sz="1600" dirty="0">
+                <a:latin typeface="Calibri" panose="020F0502020204030204" pitchFamily="34" charset="0"/>
+                <a:ea typeface="Calibri" panose="020F0502020204030204" pitchFamily="34" charset="0"/>
+                <a:cs typeface="Times New Roman" panose="02020603050405020304" pitchFamily="18" charset="0"/>
+              </a:rPr>
+              <a:t>+ Works, but last major update was 2 years ago.</a:t>
+            </a:r>
+          </a:p>
+        </p:txBody>
+      </p:sp>
     </p:spTree>
     <p:extLst>
       <p:ext uri="{BB962C8B-B14F-4D97-AF65-F5344CB8AC3E}">
-        <p14:creationId xmlns:p14="http://schemas.microsoft.com/office/powerpoint/2010/main" val="1034752107"/>
-      </p:ext>
-    </p:extLst>
-  </p:cSld>
-  <p:clrMapOvr>
-    <a:masterClrMapping/>
-  </p:clrMapOvr>
-</p:sld>
-</file>
-
-<file path=ppt/slides/slide9.xml><?xml version="1.0" encoding="utf-8"?>
-<p:sld xmlns:a="http://schemas.openxmlformats.org/drawingml/2006/main" xmlns:r="http://schemas.openxmlformats.org/officeDocument/2006/relationships" xmlns:p="http://schemas.openxmlformats.org/presentationml/2006/main">
-  <p:cSld>
-    <p:spTree>
-      <p:nvGrpSpPr>
-        <p:cNvPr id="1" name=""/>
-        <p:cNvGrpSpPr/>
-        <p:nvPr/>
-      </p:nvGrpSpPr>
-      <p:grpSpPr>
-        <a:xfrm>
-          <a:off x="0" y="0"/>
-          <a:ext cx="0" cy="0"/>
-          <a:chOff x="0" y="0"/>
-          <a:chExt cx="0" cy="0"/>
-        </a:xfrm>
-      </p:grpSpPr>
-      <p:sp>
-        <p:nvSpPr>
-          <p:cNvPr id="2" name="Title 1">
-            <a:extLst>
-              <a:ext uri="{FF2B5EF4-FFF2-40B4-BE49-F238E27FC236}">
-                <a16:creationId xmlns:a16="http://schemas.microsoft.com/office/drawing/2014/main" id="{4F909432-576F-DD4E-B149-428ED4C0B148}"/>
-              </a:ext>
-            </a:extLst>
-          </p:cNvPr>
-          <p:cNvSpPr>
-            <a:spLocks noGrp="1"/>
-          </p:cNvSpPr>
-          <p:nvPr>
-            <p:ph type="title"/>
-          </p:nvPr>
-        </p:nvSpPr>
-        <p:spPr/>
-        <p:txBody>
-          <a:bodyPr/>
-          <a:lstStyle/>
-          <a:p>
-            <a:r>
-              <a:rPr lang="en-US" dirty="0"/>
-              <a:t>Enterprise considerations</a:t>
-            </a:r>
-          </a:p>
-        </p:txBody>
-      </p:sp>
-      <p:sp>
-        <p:nvSpPr>
-          <p:cNvPr id="3" name="Content Placeholder 2">
-            <a:extLst>
-              <a:ext uri="{FF2B5EF4-FFF2-40B4-BE49-F238E27FC236}">
-                <a16:creationId xmlns:a16="http://schemas.microsoft.com/office/drawing/2014/main" id="{E3F3B1BE-0E0D-134F-86FD-854FF4BEAB9A}"/>
-              </a:ext>
-            </a:extLst>
-          </p:cNvPr>
-          <p:cNvSpPr>
-            <a:spLocks noGrp="1"/>
-          </p:cNvSpPr>
-          <p:nvPr>
-            <p:ph idx="1"/>
-          </p:nvPr>
-        </p:nvSpPr>
-        <p:spPr/>
-        <p:txBody>
-          <a:bodyPr/>
-          <a:lstStyle/>
-          <a:p>
-            <a:r>
-              <a:rPr lang="en-US" dirty="0"/>
-              <a:t>In enterprise setting, you may have limitations on which types of packages you can install on the server, so you may be limited to mostly base R or system commands. </a:t>
-            </a:r>
-          </a:p>
-          <a:p>
-            <a:pPr marL="0" indent="0">
-              <a:buNone/>
-            </a:pPr>
-            <a:endParaRPr lang="en-US" dirty="0"/>
-          </a:p>
-          <a:p>
-            <a:r>
-              <a:rPr lang="en-US" dirty="0"/>
-              <a:t>In the demo, I give an example of a workflow created under this scenario.</a:t>
-            </a:r>
-          </a:p>
-        </p:txBody>
-      </p:sp>
-    </p:spTree>
-    <p:extLst>
-      <p:ext uri="{BB962C8B-B14F-4D97-AF65-F5344CB8AC3E}">
-        <p14:creationId xmlns:p14="http://schemas.microsoft.com/office/powerpoint/2010/main" val="4241006663"/>
+        <p14:creationId xmlns:p14="http://schemas.microsoft.com/office/powerpoint/2010/main" val="818743960"/>
       </p:ext>
     </p:extLst>
   </p:cSld>

</xml_diff>